<commit_message>
Ajuste nos slides de strings
</commit_message>
<xml_diff>
--- a/programacao-basica/strings.pptx
+++ b/programacao-basica/strings.pptx
@@ -817,7 +817,7 @@
   <p:cSld>
     <p:spTree>
       <p:nvGrpSpPr>
-        <p:cNvPr id="223" name="Shape 223"/>
+        <p:cNvPr id="216" name="Shape 216"/>
         <p:cNvGrpSpPr/>
         <p:nvPr/>
       </p:nvGrpSpPr>
@@ -831,7 +831,7 @@
       </p:grpSpPr>
       <p:sp>
         <p:nvSpPr>
-          <p:cNvPr id="224" name="Google Shape;224;g1e1a49a003f_0_327:notes"/>
+          <p:cNvPr id="217" name="Google Shape;217;g1e1a49a003f_0_327:notes"/>
           <p:cNvSpPr/>
           <p:nvPr>
             <p:ph idx="2" type="sldImg"/>
@@ -866,7 +866,7 @@
       </p:sp>
       <p:sp>
         <p:nvSpPr>
-          <p:cNvPr id="225" name="Google Shape;225;g1e1a49a003f_0_327:notes"/>
+          <p:cNvPr id="218" name="Google Shape;218;g1e1a49a003f_0_327:notes"/>
           <p:cNvSpPr txBox="1"/>
           <p:nvPr>
             <p:ph idx="1" type="body"/>
@@ -916,7 +916,7 @@
   <p:cSld>
     <p:spTree>
       <p:nvGrpSpPr>
-        <p:cNvPr id="242" name="Shape 242"/>
+        <p:cNvPr id="235" name="Shape 235"/>
         <p:cNvGrpSpPr/>
         <p:nvPr/>
       </p:nvGrpSpPr>
@@ -930,7 +930,7 @@
       </p:grpSpPr>
       <p:sp>
         <p:nvSpPr>
-          <p:cNvPr id="243" name="Google Shape;243;g1e1a49a003f_0_361:notes"/>
+          <p:cNvPr id="236" name="Google Shape;236;g1e1a49a003f_0_361:notes"/>
           <p:cNvSpPr/>
           <p:nvPr>
             <p:ph idx="2" type="sldImg"/>
@@ -965,7 +965,7 @@
       </p:sp>
       <p:sp>
         <p:nvSpPr>
-          <p:cNvPr id="244" name="Google Shape;244;g1e1a49a003f_0_361:notes"/>
+          <p:cNvPr id="237" name="Google Shape;237;g1e1a49a003f_0_361:notes"/>
           <p:cNvSpPr txBox="1"/>
           <p:nvPr>
             <p:ph idx="1" type="body"/>
@@ -1015,7 +1015,7 @@
   <p:cSld>
     <p:spTree>
       <p:nvGrpSpPr>
-        <p:cNvPr id="261" name="Shape 261"/>
+        <p:cNvPr id="254" name="Shape 254"/>
         <p:cNvGrpSpPr/>
         <p:nvPr/>
       </p:nvGrpSpPr>
@@ -1029,7 +1029,7 @@
       </p:grpSpPr>
       <p:sp>
         <p:nvSpPr>
-          <p:cNvPr id="262" name="Google Shape;262;g1e1a49a003f_0_191:notes"/>
+          <p:cNvPr id="255" name="Google Shape;255;g1e1a49a003f_0_191:notes"/>
           <p:cNvSpPr/>
           <p:nvPr>
             <p:ph idx="2" type="sldImg"/>
@@ -1064,7 +1064,7 @@
       </p:sp>
       <p:sp>
         <p:nvSpPr>
-          <p:cNvPr id="263" name="Google Shape;263;g1e1a49a003f_0_191:notes"/>
+          <p:cNvPr id="256" name="Google Shape;256;g1e1a49a003f_0_191:notes"/>
           <p:cNvSpPr txBox="1"/>
           <p:nvPr>
             <p:ph idx="1" type="body"/>
@@ -1708,7 +1708,7 @@
   <p:cSld>
     <p:spTree>
       <p:nvGrpSpPr>
-        <p:cNvPr id="175" name="Shape 175"/>
+        <p:cNvPr id="174" name="Shape 174"/>
         <p:cNvGrpSpPr/>
         <p:nvPr/>
       </p:nvGrpSpPr>
@@ -1722,7 +1722,7 @@
       </p:grpSpPr>
       <p:sp>
         <p:nvSpPr>
-          <p:cNvPr id="176" name="Google Shape;176;g1e1a49a003f_0_276:notes"/>
+          <p:cNvPr id="175" name="Google Shape;175;g1e1a49a003f_0_276:notes"/>
           <p:cNvSpPr/>
           <p:nvPr>
             <p:ph idx="2" type="sldImg"/>
@@ -1757,7 +1757,7 @@
       </p:sp>
       <p:sp>
         <p:nvSpPr>
-          <p:cNvPr id="177" name="Google Shape;177;g1e1a49a003f_0_276:notes"/>
+          <p:cNvPr id="176" name="Google Shape;176;g1e1a49a003f_0_276:notes"/>
           <p:cNvSpPr txBox="1"/>
           <p:nvPr>
             <p:ph idx="1" type="body"/>
@@ -1807,7 +1807,7 @@
   <p:cSld>
     <p:spTree>
       <p:nvGrpSpPr>
-        <p:cNvPr id="199" name="Shape 199"/>
+        <p:cNvPr id="192" name="Shape 192"/>
         <p:cNvGrpSpPr/>
         <p:nvPr/>
       </p:nvGrpSpPr>
@@ -1821,7 +1821,7 @@
       </p:grpSpPr>
       <p:sp>
         <p:nvSpPr>
-          <p:cNvPr id="200" name="Google Shape;200;g1e1a49a003f_0_304:notes"/>
+          <p:cNvPr id="193" name="Google Shape;193;g1e1a49a003f_0_304:notes"/>
           <p:cNvSpPr/>
           <p:nvPr>
             <p:ph idx="2" type="sldImg"/>
@@ -1856,7 +1856,7 @@
       </p:sp>
       <p:sp>
         <p:nvSpPr>
-          <p:cNvPr id="201" name="Google Shape;201;g1e1a49a003f_0_304:notes"/>
+          <p:cNvPr id="194" name="Google Shape;194;g1e1a49a003f_0_304:notes"/>
           <p:cNvSpPr txBox="1"/>
           <p:nvPr>
             <p:ph idx="1" type="body"/>
@@ -8239,7 +8239,11 @@
             </a:pPr>
             <a:r>
               <a:rPr lang="pt-BR" sz="4600"/>
-              <a:t>Estruturas de dados Básica</a:t>
+              <a:t>Programação </a:t>
+            </a:r>
+            <a:r>
+              <a:rPr lang="pt-BR" sz="4600"/>
+              <a:t>Básica</a:t>
             </a:r>
             <a:endParaRPr sz="4600"/>
           </a:p>
@@ -8407,7 +8411,7 @@
   <p:cSld>
     <p:spTree>
       <p:nvGrpSpPr>
-        <p:cNvPr id="226" name="Shape 226"/>
+        <p:cNvPr id="219" name="Shape 219"/>
         <p:cNvGrpSpPr/>
         <p:nvPr/>
       </p:nvGrpSpPr>
@@ -8421,7 +8425,7 @@
       </p:grpSpPr>
       <p:sp>
         <p:nvSpPr>
-          <p:cNvPr id="227" name="Google Shape;227;p22"/>
+          <p:cNvPr id="220" name="Google Shape;220;p22"/>
           <p:cNvSpPr txBox="1"/>
           <p:nvPr>
             <p:ph type="title"/>
@@ -8461,7 +8465,7 @@
       </p:sp>
       <p:sp>
         <p:nvSpPr>
-          <p:cNvPr id="228" name="Google Shape;228;p22"/>
+          <p:cNvPr id="221" name="Google Shape;221;p22"/>
           <p:cNvSpPr txBox="1"/>
           <p:nvPr>
             <p:ph idx="1" type="body"/>
@@ -8470,7 +8474,7 @@
         <p:spPr>
           <a:xfrm>
             <a:off x="727650" y="1393100"/>
-            <a:ext cx="7688700" cy="410100"/>
+            <a:ext cx="7688700" cy="633600"/>
           </a:xfrm>
           <a:prstGeom prst="rect">
             <a:avLst/>
@@ -8497,7 +8501,7 @@
             </a:r>
             <a:r>
               <a:rPr lang="pt-BR" sz="1400"/>
-              <a:t>São comandos da classe de strings. Existem vários, consulte a </a:t>
+              <a:t>São comandos da  classe de strings. Existem vários, consulte a </a:t>
             </a:r>
             <a:r>
               <a:rPr lang="pt-BR" sz="1400" u="sng">
@@ -8519,7 +8523,7 @@
             </a:r>
             <a:r>
               <a:rPr lang="pt-BR" sz="1400"/>
-              <a:t> para mais</a:t>
+              <a:t> para mais.</a:t>
             </a:r>
             <a:endParaRPr sz="1400"/>
           </a:p>
@@ -8527,7 +8531,7 @@
       </p:sp>
       <p:sp>
         <p:nvSpPr>
-          <p:cNvPr id="229" name="Google Shape;229;p22"/>
+          <p:cNvPr id="222" name="Google Shape;222;p22"/>
           <p:cNvSpPr txBox="1"/>
           <p:nvPr>
             <p:ph idx="1" type="body"/>
@@ -8587,7 +8591,7 @@
       </p:sp>
       <p:pic>
         <p:nvPicPr>
-          <p:cNvPr id="230" name="Google Shape;230;p22"/>
+          <p:cNvPr id="223" name="Google Shape;223;p22"/>
           <p:cNvPicPr preferRelativeResize="0"/>
           <p:nvPr/>
         </p:nvPicPr>
@@ -8615,7 +8619,7 @@
       </p:pic>
       <p:pic>
         <p:nvPicPr>
-          <p:cNvPr id="231" name="Google Shape;231;p22"/>
+          <p:cNvPr id="224" name="Google Shape;224;p22"/>
           <p:cNvPicPr preferRelativeResize="0"/>
           <p:nvPr/>
         </p:nvPicPr>
@@ -8643,7 +8647,7 @@
       </p:pic>
       <p:sp>
         <p:nvSpPr>
-          <p:cNvPr id="232" name="Google Shape;232;p22"/>
+          <p:cNvPr id="225" name="Google Shape;225;p22"/>
           <p:cNvSpPr txBox="1"/>
           <p:nvPr/>
         </p:nvSpPr>
@@ -8709,7 +8713,7 @@
       </p:sp>
       <p:sp>
         <p:nvSpPr>
-          <p:cNvPr id="233" name="Google Shape;233;p22"/>
+          <p:cNvPr id="226" name="Google Shape;226;p22"/>
           <p:cNvSpPr/>
           <p:nvPr/>
         </p:nvSpPr>
@@ -8777,7 +8781,7 @@
       </p:sp>
       <p:sp>
         <p:nvSpPr>
-          <p:cNvPr id="234" name="Google Shape;234;p22"/>
+          <p:cNvPr id="227" name="Google Shape;227;p22"/>
           <p:cNvSpPr txBox="1"/>
           <p:nvPr/>
         </p:nvSpPr>
@@ -8835,7 +8839,7 @@
       </p:sp>
       <p:sp>
         <p:nvSpPr>
-          <p:cNvPr id="235" name="Google Shape;235;p22"/>
+          <p:cNvPr id="228" name="Google Shape;228;p22"/>
           <p:cNvSpPr txBox="1"/>
           <p:nvPr>
             <p:ph idx="1" type="body"/>
@@ -8887,7 +8891,7 @@
       </p:sp>
       <p:pic>
         <p:nvPicPr>
-          <p:cNvPr id="236" name="Google Shape;236;p22"/>
+          <p:cNvPr id="229" name="Google Shape;229;p22"/>
           <p:cNvPicPr preferRelativeResize="0"/>
           <p:nvPr/>
         </p:nvPicPr>
@@ -8915,7 +8919,7 @@
       </p:pic>
       <p:sp>
         <p:nvSpPr>
-          <p:cNvPr id="237" name="Google Shape;237;p22"/>
+          <p:cNvPr id="230" name="Google Shape;230;p22"/>
           <p:cNvSpPr txBox="1"/>
           <p:nvPr/>
         </p:nvSpPr>
@@ -8981,7 +8985,7 @@
       </p:sp>
       <p:sp>
         <p:nvSpPr>
-          <p:cNvPr id="238" name="Google Shape;238;p22"/>
+          <p:cNvPr id="231" name="Google Shape;231;p22"/>
           <p:cNvSpPr/>
           <p:nvPr/>
         </p:nvSpPr>
@@ -9049,7 +9053,7 @@
       </p:sp>
       <p:pic>
         <p:nvPicPr>
-          <p:cNvPr id="239" name="Google Shape;239;p22"/>
+          <p:cNvPr id="232" name="Google Shape;232;p22"/>
           <p:cNvPicPr preferRelativeResize="0"/>
           <p:nvPr/>
         </p:nvPicPr>
@@ -9077,7 +9081,7 @@
       </p:pic>
       <p:sp>
         <p:nvSpPr>
-          <p:cNvPr id="240" name="Google Shape;240;p22"/>
+          <p:cNvPr id="233" name="Google Shape;233;p22"/>
           <p:cNvSpPr txBox="1"/>
           <p:nvPr/>
         </p:nvSpPr>
@@ -9135,7 +9139,7 @@
       </p:sp>
       <p:sp>
         <p:nvSpPr>
-          <p:cNvPr id="241" name="Google Shape;241;p22"/>
+          <p:cNvPr id="234" name="Google Shape;234;p22"/>
           <p:cNvSpPr txBox="1"/>
           <p:nvPr>
             <p:ph idx="12" type="sldNum"/>
@@ -9186,7 +9190,7 @@
   <p:cSld>
     <p:spTree>
       <p:nvGrpSpPr>
-        <p:cNvPr id="245" name="Shape 245"/>
+        <p:cNvPr id="238" name="Shape 238"/>
         <p:cNvGrpSpPr/>
         <p:nvPr/>
       </p:nvGrpSpPr>
@@ -9200,7 +9204,7 @@
       </p:grpSpPr>
       <p:sp>
         <p:nvSpPr>
-          <p:cNvPr id="246" name="Google Shape;246;p23"/>
+          <p:cNvPr id="239" name="Google Shape;239;p23"/>
           <p:cNvSpPr txBox="1"/>
           <p:nvPr>
             <p:ph type="title"/>
@@ -9240,7 +9244,7 @@
       </p:sp>
       <p:sp>
         <p:nvSpPr>
-          <p:cNvPr id="247" name="Google Shape;247;p23"/>
+          <p:cNvPr id="240" name="Google Shape;240;p23"/>
           <p:cNvSpPr txBox="1"/>
           <p:nvPr>
             <p:ph idx="1" type="body"/>
@@ -9280,7 +9284,7 @@
       </p:sp>
       <p:sp>
         <p:nvSpPr>
-          <p:cNvPr id="248" name="Google Shape;248;p23"/>
+          <p:cNvPr id="241" name="Google Shape;241;p23"/>
           <p:cNvSpPr txBox="1"/>
           <p:nvPr>
             <p:ph idx="1" type="body"/>
@@ -9344,7 +9348,7 @@
       </p:sp>
       <p:sp>
         <p:nvSpPr>
-          <p:cNvPr id="249" name="Google Shape;249;p23"/>
+          <p:cNvPr id="242" name="Google Shape;242;p23"/>
           <p:cNvSpPr txBox="1"/>
           <p:nvPr/>
         </p:nvSpPr>
@@ -9410,7 +9414,7 @@
       </p:sp>
       <p:sp>
         <p:nvSpPr>
-          <p:cNvPr id="250" name="Google Shape;250;p23"/>
+          <p:cNvPr id="243" name="Google Shape;243;p23"/>
           <p:cNvSpPr/>
           <p:nvPr/>
         </p:nvSpPr>
@@ -9478,7 +9482,7 @@
       </p:sp>
       <p:sp>
         <p:nvSpPr>
-          <p:cNvPr id="251" name="Google Shape;251;p23"/>
+          <p:cNvPr id="244" name="Google Shape;244;p23"/>
           <p:cNvSpPr txBox="1"/>
           <p:nvPr/>
         </p:nvSpPr>
@@ -9536,7 +9540,7 @@
       </p:sp>
       <p:sp>
         <p:nvSpPr>
-          <p:cNvPr id="252" name="Google Shape;252;p23"/>
+          <p:cNvPr id="245" name="Google Shape;245;p23"/>
           <p:cNvSpPr txBox="1"/>
           <p:nvPr>
             <p:ph idx="1" type="body"/>
@@ -9600,7 +9604,7 @@
       </p:sp>
       <p:sp>
         <p:nvSpPr>
-          <p:cNvPr id="253" name="Google Shape;253;p23"/>
+          <p:cNvPr id="246" name="Google Shape;246;p23"/>
           <p:cNvSpPr txBox="1"/>
           <p:nvPr/>
         </p:nvSpPr>
@@ -9666,7 +9670,7 @@
       </p:sp>
       <p:sp>
         <p:nvSpPr>
-          <p:cNvPr id="254" name="Google Shape;254;p23"/>
+          <p:cNvPr id="247" name="Google Shape;247;p23"/>
           <p:cNvSpPr/>
           <p:nvPr/>
         </p:nvSpPr>
@@ -9734,7 +9738,7 @@
       </p:sp>
       <p:sp>
         <p:nvSpPr>
-          <p:cNvPr id="255" name="Google Shape;255;p23"/>
+          <p:cNvPr id="248" name="Google Shape;248;p23"/>
           <p:cNvSpPr txBox="1"/>
           <p:nvPr/>
         </p:nvSpPr>
@@ -9792,7 +9796,7 @@
       </p:sp>
       <p:pic>
         <p:nvPicPr>
-          <p:cNvPr id="256" name="Google Shape;256;p23"/>
+          <p:cNvPr id="249" name="Google Shape;249;p23"/>
           <p:cNvPicPr preferRelativeResize="0"/>
           <p:nvPr/>
         </p:nvPicPr>
@@ -9820,7 +9824,7 @@
       </p:pic>
       <p:pic>
         <p:nvPicPr>
-          <p:cNvPr id="257" name="Google Shape;257;p23"/>
+          <p:cNvPr id="250" name="Google Shape;250;p23"/>
           <p:cNvPicPr preferRelativeResize="0"/>
           <p:nvPr/>
         </p:nvPicPr>
@@ -9848,7 +9852,7 @@
       </p:pic>
       <p:pic>
         <p:nvPicPr>
-          <p:cNvPr id="258" name="Google Shape;258;p23"/>
+          <p:cNvPr id="251" name="Google Shape;251;p23"/>
           <p:cNvPicPr preferRelativeResize="0"/>
           <p:nvPr/>
         </p:nvPicPr>
@@ -9876,7 +9880,7 @@
       </p:pic>
       <p:pic>
         <p:nvPicPr>
-          <p:cNvPr id="259" name="Google Shape;259;p23"/>
+          <p:cNvPr id="252" name="Google Shape;252;p23"/>
           <p:cNvPicPr preferRelativeResize="0"/>
           <p:nvPr/>
         </p:nvPicPr>
@@ -9904,7 +9908,7 @@
       </p:pic>
       <p:sp>
         <p:nvSpPr>
-          <p:cNvPr id="260" name="Google Shape;260;p23"/>
+          <p:cNvPr id="253" name="Google Shape;253;p23"/>
           <p:cNvSpPr txBox="1"/>
           <p:nvPr>
             <p:ph idx="12" type="sldNum"/>
@@ -9955,7 +9959,7 @@
   <p:cSld>
     <p:spTree>
       <p:nvGrpSpPr>
-        <p:cNvPr id="264" name="Shape 264"/>
+        <p:cNvPr id="257" name="Shape 257"/>
         <p:cNvGrpSpPr/>
         <p:nvPr/>
       </p:nvGrpSpPr>
@@ -9969,7 +9973,7 @@
       </p:grpSpPr>
       <p:sp>
         <p:nvSpPr>
-          <p:cNvPr id="265" name="Google Shape;265;p24"/>
+          <p:cNvPr id="258" name="Google Shape;258;p24"/>
           <p:cNvSpPr txBox="1"/>
           <p:nvPr>
             <p:ph type="title"/>
@@ -10044,7 +10048,7 @@
       </p:sp>
       <p:sp>
         <p:nvSpPr>
-          <p:cNvPr id="266" name="Google Shape;266;p24"/>
+          <p:cNvPr id="259" name="Google Shape;259;p24"/>
           <p:cNvSpPr txBox="1"/>
           <p:nvPr>
             <p:ph idx="1" type="body"/>
@@ -10101,7 +10105,7 @@
       </p:sp>
       <p:sp>
         <p:nvSpPr>
-          <p:cNvPr id="267" name="Google Shape;267;p24"/>
+          <p:cNvPr id="260" name="Google Shape;260;p24"/>
           <p:cNvSpPr txBox="1"/>
           <p:nvPr>
             <p:ph idx="12" type="sldNum"/>
@@ -10141,7 +10145,7 @@
       </p:sp>
       <p:pic>
         <p:nvPicPr>
-          <p:cNvPr id="268" name="Google Shape;268;p24"/>
+          <p:cNvPr id="261" name="Google Shape;261;p24"/>
           <p:cNvPicPr preferRelativeResize="0"/>
           <p:nvPr/>
         </p:nvPicPr>
@@ -10169,7 +10173,7 @@
       </p:pic>
       <p:sp>
         <p:nvSpPr>
-          <p:cNvPr id="269" name="Google Shape;269;p24"/>
+          <p:cNvPr id="262" name="Google Shape;262;p24"/>
           <p:cNvSpPr/>
           <p:nvPr/>
         </p:nvSpPr>
@@ -10220,7 +10224,7 @@
       </p:sp>
       <p:sp>
         <p:nvSpPr>
-          <p:cNvPr id="270" name="Google Shape;270;p24"/>
+          <p:cNvPr id="263" name="Google Shape;263;p24"/>
           <p:cNvSpPr txBox="1"/>
           <p:nvPr>
             <p:ph idx="1" type="body"/>
@@ -11245,8 +11249,8 @@
         </p:nvSpPr>
         <p:spPr>
           <a:xfrm>
-            <a:off x="729450" y="2078875"/>
-            <a:ext cx="7688700" cy="686700"/>
+            <a:off x="727650" y="1853850"/>
+            <a:ext cx="7688700" cy="1411800"/>
           </a:xfrm>
           <a:prstGeom prst="rect">
             <a:avLst/>
@@ -11258,7 +11262,7 @@
           </a:bodyPr>
           <a:lstStyle/>
           <a:p>
-            <a:pPr indent="457200" lvl="0" marL="0" rtl="0" algn="l">
+            <a:pPr indent="457200" lvl="0" marL="0" rtl="0" algn="just">
               <a:spcBef>
                 <a:spcPts val="0"/>
               </a:spcBef>
@@ -11269,15 +11273,63 @@
             </a:pPr>
             <a:r>
               <a:rPr lang="pt-BR" sz="1400"/>
-              <a:t>String é uma cadeia de caracteres de tamanho variável, funciona de maneira similar a um vetor de </a:t>
+              <a:t>Strings são </a:t>
             </a:r>
             <a:r>
               <a:rPr lang="pt-BR" sz="1400"/>
-              <a:t>caracteres.</a:t>
+              <a:t>contêineres</a:t>
             </a:r>
             <a:r>
               <a:rPr lang="pt-BR" sz="1400"/>
-              <a:t> Entretanto apresenta funcionalidades extras que serão explicadas a seguir.</a:t>
+              <a:t> de cadeias de caracteres terminadas em ‘\0’. Podem ser utilizadas ao  incluir a biblioteca &lt;string&gt;, que já vem </a:t>
+            </a:r>
+            <a:r>
+              <a:rPr lang="pt-BR" sz="1400"/>
+              <a:t>incluída</a:t>
+            </a:r>
+            <a:r>
+              <a:rPr lang="pt-BR" sz="1400"/>
+              <a:t> na </a:t>
+            </a:r>
+            <a:r>
+              <a:rPr lang="pt-BR" sz="1400"/>
+              <a:t>biblioteca</a:t>
+            </a:r>
+            <a:r>
+              <a:rPr lang="pt-BR" sz="1400"/>
+              <a:t> padrão de c++. Seu funcionamento é similar a um vetor de </a:t>
+            </a:r>
+            <a:r>
+              <a:rPr lang="pt-BR" sz="1400"/>
+              <a:t>caracteres, mas com tamanho variável.</a:t>
+            </a:r>
+            <a:r>
+              <a:rPr lang="pt-BR" sz="1400"/>
+              <a:t> P</a:t>
+            </a:r>
+            <a:r>
+              <a:rPr lang="pt-BR" sz="1400"/>
+              <a:t>or</a:t>
+            </a:r>
+            <a:r>
+              <a:rPr lang="pt-BR" sz="1400"/>
+              <a:t> serem </a:t>
+            </a:r>
+            <a:r>
+              <a:rPr lang="pt-BR" sz="1400"/>
+              <a:t>containers,</a:t>
+            </a:r>
+            <a:r>
+              <a:rPr lang="pt-BR" sz="1400"/>
+              <a:t> apresentam funcionalidades extras que a tornam uma estrutura mais interessante para competições do que vetores de caracteres, tais funcionalidades</a:t>
+            </a:r>
+            <a:r>
+              <a:rPr lang="pt-BR" sz="1400"/>
+              <a:t> serão explicadas a diante</a:t>
+            </a:r>
+            <a:r>
+              <a:rPr lang="pt-BR" sz="1400"/>
+              <a:t>.</a:t>
             </a:r>
             <a:endParaRPr sz="1400"/>
           </a:p>
@@ -11293,7 +11345,7 @@
         </p:nvSpPr>
         <p:spPr>
           <a:xfrm>
-            <a:off x="691275" y="3570650"/>
+            <a:off x="729450" y="3875625"/>
             <a:ext cx="7688700" cy="462300"/>
           </a:xfrm>
           <a:prstGeom prst="rect">
@@ -11338,7 +11390,7 @@
         </p:blipFill>
         <p:spPr>
           <a:xfrm>
-            <a:off x="4968750" y="3644838"/>
+            <a:off x="5006925" y="3949813"/>
             <a:ext cx="2094575" cy="320525"/>
           </a:xfrm>
           <a:prstGeom prst="rect">
@@ -11360,7 +11412,7 @@
         </p:nvSpPr>
         <p:spPr>
           <a:xfrm>
-            <a:off x="690375" y="4226625"/>
+            <a:off x="727200" y="4377475"/>
             <a:ext cx="7688700" cy="535200"/>
           </a:xfrm>
           <a:prstGeom prst="rect">
@@ -11406,7 +11458,7 @@
         </p:blipFill>
         <p:spPr>
           <a:xfrm>
-            <a:off x="3888670" y="2696888"/>
+            <a:off x="3888220" y="3188938"/>
             <a:ext cx="1366668" cy="686700"/>
           </a:xfrm>
           <a:prstGeom prst="rect">
@@ -11426,7 +11478,7 @@
         </p:nvGrpSpPr>
         <p:grpSpPr>
           <a:xfrm>
-            <a:off x="5676887" y="4289175"/>
+            <a:off x="5713712" y="4440025"/>
             <a:ext cx="678298" cy="410100"/>
             <a:chOff x="6671675" y="2791675"/>
             <a:chExt cx="678298" cy="410100"/>
@@ -12608,7 +12660,7 @@
         <p:spPr>
           <a:xfrm>
             <a:off x="727650" y="1393100"/>
-            <a:ext cx="7688700" cy="522000"/>
+            <a:ext cx="7688700" cy="681000"/>
           </a:xfrm>
           <a:prstGeom prst="rect">
             <a:avLst/>
@@ -12620,7 +12672,7 @@
           </a:bodyPr>
           <a:lstStyle/>
           <a:p>
-            <a:pPr indent="457200" lvl="0" marL="0" rtl="0" algn="l">
+            <a:pPr indent="457200" lvl="0" marL="0" rtl="0" algn="just">
               <a:spcBef>
                 <a:spcPts val="0"/>
               </a:spcBef>
@@ -12635,128 +12687,30 @@
             </a:r>
             <a:r>
               <a:rPr lang="pt-BR" sz="1400"/>
-              <a:t>Ao imprimir string</a:t>
-            </a:r>
-            <a:r>
-              <a:rPr lang="pt-BR" sz="1400"/>
-              <a:t> com valor atribuído em posição ainda não criada, nada muda.</a:t>
+              <a:t>Se tentarmos atribuir valor a uma posição já criada, a posição terá seu valor substituído.</a:t>
             </a:r>
             <a:endParaRPr sz="1400"/>
           </a:p>
         </p:txBody>
       </p:sp>
-      <p:grpSp>
-        <p:nvGrpSpPr>
-          <p:cNvPr id="162" name="Google Shape;162;p19"/>
-          <p:cNvGrpSpPr/>
-          <p:nvPr/>
-        </p:nvGrpSpPr>
-        <p:grpSpPr>
-          <a:xfrm>
-            <a:off x="5717212" y="2231575"/>
-            <a:ext cx="678298" cy="410100"/>
-            <a:chOff x="6671675" y="2791675"/>
-            <a:chExt cx="678298" cy="410100"/>
-          </a:xfrm>
-        </p:grpSpPr>
-        <p:pic>
-          <p:nvPicPr>
-            <p:cNvPr id="163" name="Google Shape;163;p19"/>
-            <p:cNvPicPr preferRelativeResize="0"/>
-            <p:nvPr/>
-          </p:nvPicPr>
-          <p:blipFill>
-            <a:blip r:embed="rId3">
-              <a:alphaModFix/>
-            </a:blip>
-            <a:stretch>
-              <a:fillRect/>
-            </a:stretch>
-          </p:blipFill>
-          <p:spPr>
-            <a:xfrm>
-              <a:off x="6947373" y="2791675"/>
-              <a:ext cx="402600" cy="410100"/>
-            </a:xfrm>
-            <a:prstGeom prst="rect">
-              <a:avLst/>
-            </a:prstGeom>
-            <a:noFill/>
-            <a:ln>
-              <a:noFill/>
-            </a:ln>
-          </p:spPr>
-        </p:pic>
-        <p:sp>
-          <p:nvSpPr>
-            <p:cNvPr id="164" name="Google Shape;164;p19"/>
-            <p:cNvSpPr txBox="1"/>
-            <p:nvPr/>
-          </p:nvSpPr>
-          <p:spPr>
-            <a:xfrm>
-              <a:off x="6671675" y="2796625"/>
-              <a:ext cx="275700" cy="400200"/>
-            </a:xfrm>
-            <a:prstGeom prst="rect">
-              <a:avLst/>
-            </a:prstGeom>
-            <a:noFill/>
-            <a:ln>
-              <a:noFill/>
-            </a:ln>
-          </p:spPr>
-          <p:txBody>
-            <a:bodyPr anchorCtr="0" anchor="t" bIns="91425" lIns="91425" spcFirstLastPara="1" rIns="91425" wrap="square" tIns="91425">
-              <a:spAutoFit/>
-            </a:bodyPr>
-            <a:lstStyle/>
-            <a:p>
-              <a:pPr indent="0" lvl="0" marL="0" rtl="0" algn="l">
-                <a:spcBef>
-                  <a:spcPts val="0"/>
-                </a:spcBef>
-                <a:spcAft>
-                  <a:spcPts val="0"/>
-                </a:spcAft>
-                <a:buNone/>
-              </a:pPr>
-              <a:r>
-                <a:rPr lang="pt-BR">
-                  <a:latin typeface="Lato"/>
-                  <a:ea typeface="Lato"/>
-                  <a:cs typeface="Lato"/>
-                  <a:sym typeface="Lato"/>
-                </a:rPr>
-                <a:t>S</a:t>
-              </a:r>
-              <a:endParaRPr>
-                <a:latin typeface="Lato"/>
-                <a:ea typeface="Lato"/>
-                <a:cs typeface="Lato"/>
-                <a:sym typeface="Lato"/>
-              </a:endParaRPr>
-            </a:p>
-          </p:txBody>
-        </p:sp>
-      </p:grpSp>
       <p:pic>
         <p:nvPicPr>
-          <p:cNvPr id="165" name="Google Shape;165;p19"/>
+          <p:cNvPr id="162" name="Google Shape;162;p19"/>
           <p:cNvPicPr preferRelativeResize="0"/>
           <p:nvPr/>
         </p:nvPicPr>
-        <p:blipFill rotWithShape="1">
-          <a:blip r:embed="rId4">
+        <p:blipFill>
+          <a:blip r:embed="rId3">
             <a:alphaModFix/>
           </a:blip>
-          <a:srcRect b="21673" l="0" r="0" t="0"/>
-          <a:stretch/>
+          <a:stretch>
+            <a:fillRect/>
+          </a:stretch>
         </p:blipFill>
         <p:spPr>
           <a:xfrm>
-            <a:off x="2041813" y="2067325"/>
-            <a:ext cx="971550" cy="738600"/>
+            <a:off x="1922388" y="2112526"/>
+            <a:ext cx="1561475" cy="1133548"/>
           </a:xfrm>
           <a:prstGeom prst="rect">
             <a:avLst/>
@@ -12769,13 +12723,107 @@
       </p:pic>
       <p:sp>
         <p:nvSpPr>
-          <p:cNvPr id="166" name="Google Shape;166;p19"/>
+          <p:cNvPr id="163" name="Google Shape;163;p19"/>
+          <p:cNvSpPr txBox="1"/>
+          <p:nvPr/>
+        </p:nvSpPr>
+        <p:spPr>
+          <a:xfrm>
+            <a:off x="1795913" y="1796938"/>
+            <a:ext cx="1814400" cy="400200"/>
+          </a:xfrm>
+          <a:prstGeom prst="rect">
+            <a:avLst/>
+          </a:prstGeom>
+          <a:noFill/>
+          <a:ln>
+            <a:noFill/>
+          </a:ln>
+        </p:spPr>
+        <p:txBody>
+          <a:bodyPr anchorCtr="0" anchor="t" bIns="91425" lIns="91425" spcFirstLastPara="1" rIns="91425" wrap="square" tIns="91425">
+            <a:spAutoFit/>
+          </a:bodyPr>
+          <a:lstStyle/>
+          <a:p>
+            <a:pPr indent="0" lvl="0" marL="0" marR="0" rtl="0" algn="ctr">
+              <a:lnSpc>
+                <a:spcPct val="100000"/>
+              </a:lnSpc>
+              <a:spcBef>
+                <a:spcPts val="0"/>
+              </a:spcBef>
+              <a:spcAft>
+                <a:spcPts val="0"/>
+              </a:spcAft>
+              <a:buClr>
+                <a:srgbClr val="000000"/>
+              </a:buClr>
+              <a:buSzPts val="1400"/>
+              <a:buFont typeface="Arial"/>
+              <a:buNone/>
+            </a:pPr>
+            <a:r>
+              <a:rPr b="0" i="0" lang="pt-BR" sz="1400" u="none" cap="none" strike="noStrike">
+                <a:solidFill>
+                  <a:srgbClr val="000000"/>
+                </a:solidFill>
+                <a:latin typeface="Arial"/>
+                <a:ea typeface="Arial"/>
+                <a:cs typeface="Arial"/>
+                <a:sym typeface="Arial"/>
+              </a:rPr>
+              <a:t>Exemplo:</a:t>
+            </a:r>
+            <a:endParaRPr b="0" i="0" sz="1400" u="none" cap="none" strike="noStrike">
+              <a:solidFill>
+                <a:srgbClr val="000000"/>
+              </a:solidFill>
+              <a:latin typeface="Arial"/>
+              <a:ea typeface="Arial"/>
+              <a:cs typeface="Arial"/>
+              <a:sym typeface="Arial"/>
+            </a:endParaRPr>
+          </a:p>
+        </p:txBody>
+      </p:sp>
+      <p:pic>
+        <p:nvPicPr>
+          <p:cNvPr id="164" name="Google Shape;164;p19"/>
+          <p:cNvPicPr preferRelativeResize="0"/>
+          <p:nvPr/>
+        </p:nvPicPr>
+        <p:blipFill>
+          <a:blip r:embed="rId4">
+            <a:alphaModFix/>
+          </a:blip>
+          <a:stretch>
+            <a:fillRect/>
+          </a:stretch>
+        </p:blipFill>
+        <p:spPr>
+          <a:xfrm>
+            <a:off x="6031825" y="2483612"/>
+            <a:ext cx="818125" cy="350625"/>
+          </a:xfrm>
+          <a:prstGeom prst="rect">
+            <a:avLst/>
+          </a:prstGeom>
+          <a:noFill/>
+          <a:ln>
+            <a:noFill/>
+          </a:ln>
+        </p:spPr>
+      </p:pic>
+      <p:sp>
+        <p:nvSpPr>
+          <p:cNvPr id="165" name="Google Shape;165;p19"/>
           <p:cNvSpPr/>
           <p:nvPr/>
         </p:nvSpPr>
         <p:spPr>
           <a:xfrm>
-            <a:off x="4627921" y="2292875"/>
+            <a:off x="4803421" y="2553775"/>
             <a:ext cx="661500" cy="210300"/>
           </a:xfrm>
           <a:prstGeom prst="rightArrow">
@@ -12837,13 +12885,13 @@
       </p:sp>
       <p:sp>
         <p:nvSpPr>
-          <p:cNvPr id="167" name="Google Shape;167;p19"/>
+          <p:cNvPr id="166" name="Google Shape;166;p19"/>
           <p:cNvSpPr txBox="1"/>
           <p:nvPr/>
         </p:nvSpPr>
         <p:spPr>
           <a:xfrm>
-            <a:off x="1620400" y="1751025"/>
+            <a:off x="5533688" y="2144438"/>
             <a:ext cx="1814400" cy="400200"/>
           </a:xfrm>
           <a:prstGeom prst="rect">
@@ -12878,16 +12926,8 @@
               <a:buNone/>
             </a:pPr>
             <a:r>
-              <a:rPr b="0" i="0" lang="pt-BR" sz="1400" u="none" cap="none" strike="noStrike">
-                <a:solidFill>
-                  <a:srgbClr val="000000"/>
-                </a:solidFill>
-                <a:latin typeface="Arial"/>
-                <a:ea typeface="Arial"/>
-                <a:cs typeface="Arial"/>
-                <a:sym typeface="Arial"/>
-              </a:rPr>
-              <a:t>Exemplo:</a:t>
+              <a:rPr lang="pt-BR"/>
+              <a:t>Saída:</a:t>
             </a:r>
             <a:endParaRPr b="0" i="0" sz="1400" u="none" cap="none" strike="noStrike">
               <a:solidFill>
@@ -12901,37 +12941,49 @@
           </a:p>
         </p:txBody>
       </p:sp>
-      <p:pic>
-        <p:nvPicPr>
+      <p:sp>
+        <p:nvSpPr>
+          <p:cNvPr id="167" name="Google Shape;167;p19"/>
+          <p:cNvSpPr txBox="1"/>
+          <p:nvPr>
+            <p:ph idx="12" type="sldNum"/>
+          </p:nvPr>
+        </p:nvSpPr>
+        <p:spPr>
+          <a:xfrm>
+            <a:off x="8536302" y="4749851"/>
+            <a:ext cx="548700" cy="393600"/>
+          </a:xfrm>
+          <a:prstGeom prst="rect">
+            <a:avLst/>
+          </a:prstGeom>
+        </p:spPr>
+        <p:txBody>
+          <a:bodyPr anchorCtr="0" anchor="ctr" bIns="91425" lIns="91425" spcFirstLastPara="1" rIns="91425" wrap="square" tIns="91425">
+            <a:normAutofit/>
+          </a:bodyPr>
+          <a:lstStyle/>
+          <a:p>
+            <a:pPr indent="0" lvl="0" marL="0" rtl="0" algn="r">
+              <a:spcBef>
+                <a:spcPts val="0"/>
+              </a:spcBef>
+              <a:spcAft>
+                <a:spcPts val="0"/>
+              </a:spcAft>
+              <a:buNone/>
+            </a:pPr>
+            <a:fld id="{00000000-1234-1234-1234-123412341234}" type="slidenum">
+              <a:rPr lang="pt-BR"/>
+              <a:t>‹#›</a:t>
+            </a:fld>
+            <a:endParaRPr/>
+          </a:p>
+        </p:txBody>
+      </p:sp>
+      <p:sp>
+        <p:nvSpPr>
           <p:cNvPr id="168" name="Google Shape;168;p19"/>
-          <p:cNvPicPr preferRelativeResize="0"/>
-          <p:nvPr/>
-        </p:nvPicPr>
-        <p:blipFill>
-          <a:blip r:embed="rId5">
-            <a:alphaModFix/>
-          </a:blip>
-          <a:stretch>
-            <a:fillRect/>
-          </a:stretch>
-        </p:blipFill>
-        <p:spPr>
-          <a:xfrm>
-            <a:off x="1884650" y="3369075"/>
-            <a:ext cx="1285875" cy="933450"/>
-          </a:xfrm>
-          <a:prstGeom prst="rect">
-            <a:avLst/>
-          </a:prstGeom>
-          <a:noFill/>
-          <a:ln>
-            <a:noFill/>
-          </a:ln>
-        </p:spPr>
-      </p:pic>
-      <p:sp>
-        <p:nvSpPr>
-          <p:cNvPr id="169" name="Google Shape;169;p19"/>
           <p:cNvSpPr txBox="1"/>
           <p:nvPr>
             <p:ph idx="1" type="body"/>
@@ -12939,7 +12991,7 @@
         </p:nvSpPr>
         <p:spPr>
           <a:xfrm>
-            <a:off x="729450" y="2805925"/>
+            <a:off x="729450" y="3453950"/>
             <a:ext cx="7688700" cy="410100"/>
           </a:xfrm>
           <a:prstGeom prst="rect">
@@ -12948,7 +13000,7 @@
         </p:spPr>
         <p:txBody>
           <a:bodyPr anchorCtr="0" anchor="t" bIns="91425" lIns="91425" spcFirstLastPara="1" rIns="91425" wrap="square" tIns="91425">
-            <a:normAutofit/>
+            <a:noAutofit/>
           </a:bodyPr>
           <a:lstStyle/>
           <a:p>
@@ -12963,15 +13015,15 @@
             </a:pPr>
             <a:r>
               <a:rPr lang="pt-BR" sz="1400"/>
-              <a:t>S</a:t>
+              <a:t>Se</a:t>
+            </a:r>
+            <a:r>
+              <a:rPr b="1" lang="pt-BR" sz="1400"/>
+              <a:t> </a:t>
             </a:r>
             <a:r>
               <a:rPr lang="pt-BR" sz="1400"/>
-              <a:t>e tentarmos atribuir valor a uma posição já criada, a posição terá seu valor </a:t>
-            </a:r>
-            <a:r>
-              <a:rPr lang="pt-BR" sz="1400"/>
-              <a:t>substituído.</a:t>
+              <a:t>atribuirmos valor a uma string que já tenha algo, substituiremos toda a string.</a:t>
             </a:r>
             <a:endParaRPr sz="1400"/>
           </a:p>
@@ -12979,107 +13031,13 @@
       </p:sp>
       <p:sp>
         <p:nvSpPr>
-          <p:cNvPr id="170" name="Google Shape;170;p19"/>
-          <p:cNvSpPr txBox="1"/>
-          <p:nvPr/>
-        </p:nvSpPr>
-        <p:spPr>
-          <a:xfrm>
-            <a:off x="1620413" y="3032775"/>
-            <a:ext cx="1814400" cy="400200"/>
-          </a:xfrm>
-          <a:prstGeom prst="rect">
-            <a:avLst/>
-          </a:prstGeom>
-          <a:noFill/>
-          <a:ln>
-            <a:noFill/>
-          </a:ln>
-        </p:spPr>
-        <p:txBody>
-          <a:bodyPr anchorCtr="0" anchor="t" bIns="91425" lIns="91425" spcFirstLastPara="1" rIns="91425" wrap="square" tIns="91425">
-            <a:spAutoFit/>
-          </a:bodyPr>
-          <a:lstStyle/>
-          <a:p>
-            <a:pPr indent="0" lvl="0" marL="0" marR="0" rtl="0" algn="ctr">
-              <a:lnSpc>
-                <a:spcPct val="100000"/>
-              </a:lnSpc>
-              <a:spcBef>
-                <a:spcPts val="0"/>
-              </a:spcBef>
-              <a:spcAft>
-                <a:spcPts val="0"/>
-              </a:spcAft>
-              <a:buClr>
-                <a:srgbClr val="000000"/>
-              </a:buClr>
-              <a:buSzPts val="1400"/>
-              <a:buFont typeface="Arial"/>
-              <a:buNone/>
-            </a:pPr>
-            <a:r>
-              <a:rPr b="0" i="0" lang="pt-BR" sz="1400" u="none" cap="none" strike="noStrike">
-                <a:solidFill>
-                  <a:srgbClr val="000000"/>
-                </a:solidFill>
-                <a:latin typeface="Arial"/>
-                <a:ea typeface="Arial"/>
-                <a:cs typeface="Arial"/>
-                <a:sym typeface="Arial"/>
-              </a:rPr>
-              <a:t>Exemplo:</a:t>
-            </a:r>
-            <a:endParaRPr b="0" i="0" sz="1400" u="none" cap="none" strike="noStrike">
-              <a:solidFill>
-                <a:srgbClr val="000000"/>
-              </a:solidFill>
-              <a:latin typeface="Arial"/>
-              <a:ea typeface="Arial"/>
-              <a:cs typeface="Arial"/>
-              <a:sym typeface="Arial"/>
-            </a:endParaRPr>
-          </a:p>
-        </p:txBody>
-      </p:sp>
-      <p:pic>
-        <p:nvPicPr>
-          <p:cNvPr id="171" name="Google Shape;171;p19"/>
-          <p:cNvPicPr preferRelativeResize="0"/>
-          <p:nvPr/>
-        </p:nvPicPr>
-        <p:blipFill>
-          <a:blip r:embed="rId6">
-            <a:alphaModFix/>
-          </a:blip>
-          <a:stretch>
-            <a:fillRect/>
-          </a:stretch>
-        </p:blipFill>
-        <p:spPr>
-          <a:xfrm>
-            <a:off x="5856325" y="3719450"/>
-            <a:ext cx="818125" cy="350625"/>
-          </a:xfrm>
-          <a:prstGeom prst="rect">
-            <a:avLst/>
-          </a:prstGeom>
-          <a:noFill/>
-          <a:ln>
-            <a:noFill/>
-          </a:ln>
-        </p:spPr>
-      </p:pic>
-      <p:sp>
-        <p:nvSpPr>
-          <p:cNvPr id="172" name="Google Shape;172;p19"/>
+          <p:cNvPr id="169" name="Google Shape;169;p19"/>
           <p:cNvSpPr/>
           <p:nvPr/>
         </p:nvSpPr>
         <p:spPr>
           <a:xfrm>
-            <a:off x="4627921" y="3789613"/>
+            <a:off x="4629721" y="4285375"/>
             <a:ext cx="661500" cy="210300"/>
           </a:xfrm>
           <a:prstGeom prst="rightArrow">
@@ -13141,13 +13099,13 @@
       </p:sp>
       <p:sp>
         <p:nvSpPr>
-          <p:cNvPr id="173" name="Google Shape;173;p19"/>
+          <p:cNvPr id="170" name="Google Shape;170;p19"/>
           <p:cNvSpPr txBox="1"/>
           <p:nvPr/>
         </p:nvSpPr>
         <p:spPr>
           <a:xfrm>
-            <a:off x="5358188" y="3380275"/>
+            <a:off x="1795938" y="3740450"/>
             <a:ext cx="1814400" cy="400200"/>
           </a:xfrm>
           <a:prstGeom prst="rect">
@@ -13182,8 +13140,16 @@
               <a:buNone/>
             </a:pPr>
             <a:r>
-              <a:rPr lang="pt-BR"/>
-              <a:t>Saída:</a:t>
+              <a:rPr b="0" i="0" lang="pt-BR" sz="1400" u="none" cap="none" strike="noStrike">
+                <a:solidFill>
+                  <a:srgbClr val="000000"/>
+                </a:solidFill>
+                <a:latin typeface="Arial"/>
+                <a:ea typeface="Arial"/>
+                <a:cs typeface="Arial"/>
+                <a:sym typeface="Arial"/>
+              </a:rPr>
+              <a:t>Exemplo:</a:t>
             </a:r>
             <a:endParaRPr b="0" i="0" sz="1400" u="none" cap="none" strike="noStrike">
               <a:solidFill>
@@ -13197,43 +13163,117 @@
           </a:p>
         </p:txBody>
       </p:sp>
-      <p:sp>
-        <p:nvSpPr>
-          <p:cNvPr id="174" name="Google Shape;174;p19"/>
+      <p:pic>
+        <p:nvPicPr>
+          <p:cNvPr id="171" name="Google Shape;171;p19"/>
+          <p:cNvPicPr preferRelativeResize="0"/>
+          <p:nvPr/>
+        </p:nvPicPr>
+        <p:blipFill>
+          <a:blip r:embed="rId5">
+            <a:alphaModFix/>
+          </a:blip>
+          <a:stretch>
+            <a:fillRect/>
+          </a:stretch>
+        </p:blipFill>
+        <p:spPr>
+          <a:xfrm>
+            <a:off x="1968102" y="4068850"/>
+            <a:ext cx="1470067" cy="681000"/>
+          </a:xfrm>
+          <a:prstGeom prst="rect">
+            <a:avLst/>
+          </a:prstGeom>
+          <a:noFill/>
+          <a:ln>
+            <a:noFill/>
+          </a:ln>
+        </p:spPr>
+      </p:pic>
+      <p:pic>
+        <p:nvPicPr>
+          <p:cNvPr id="172" name="Google Shape;172;p19"/>
+          <p:cNvPicPr preferRelativeResize="0"/>
+          <p:nvPr/>
+        </p:nvPicPr>
+        <p:blipFill>
+          <a:blip r:embed="rId6">
+            <a:alphaModFix/>
+          </a:blip>
+          <a:stretch>
+            <a:fillRect/>
+          </a:stretch>
+        </p:blipFill>
+        <p:spPr>
+          <a:xfrm>
+            <a:off x="5895263" y="4221475"/>
+            <a:ext cx="743875" cy="338125"/>
+          </a:xfrm>
+          <a:prstGeom prst="rect">
+            <a:avLst/>
+          </a:prstGeom>
+          <a:noFill/>
+          <a:ln>
+            <a:noFill/>
+          </a:ln>
+        </p:spPr>
+      </p:pic>
+      <p:sp>
+        <p:nvSpPr>
+          <p:cNvPr id="173" name="Google Shape;173;p19"/>
           <p:cNvSpPr txBox="1"/>
-          <p:nvPr>
-            <p:ph idx="12" type="sldNum"/>
-          </p:nvPr>
-        </p:nvSpPr>
-        <p:spPr>
-          <a:xfrm>
-            <a:off x="8536302" y="4749851"/>
-            <a:ext cx="548700" cy="393600"/>
-          </a:xfrm>
-          <a:prstGeom prst="rect">
-            <a:avLst/>
-          </a:prstGeom>
+          <p:nvPr/>
+        </p:nvSpPr>
+        <p:spPr>
+          <a:xfrm>
+            <a:off x="5360000" y="3894800"/>
+            <a:ext cx="1814400" cy="400200"/>
+          </a:xfrm>
+          <a:prstGeom prst="rect">
+            <a:avLst/>
+          </a:prstGeom>
+          <a:noFill/>
+          <a:ln>
+            <a:noFill/>
+          </a:ln>
         </p:spPr>
         <p:txBody>
-          <a:bodyPr anchorCtr="0" anchor="ctr" bIns="91425" lIns="91425" spcFirstLastPara="1" rIns="91425" wrap="square" tIns="91425">
-            <a:normAutofit/>
+          <a:bodyPr anchorCtr="0" anchor="t" bIns="91425" lIns="91425" spcFirstLastPara="1" rIns="91425" wrap="square" tIns="91425">
+            <a:spAutoFit/>
           </a:bodyPr>
           <a:lstStyle/>
           <a:p>
-            <a:pPr indent="0" lvl="0" marL="0" rtl="0" algn="r">
-              <a:spcBef>
-                <a:spcPts val="0"/>
-              </a:spcBef>
-              <a:spcAft>
-                <a:spcPts val="0"/>
-              </a:spcAft>
+            <a:pPr indent="0" lvl="0" marL="0" marR="0" rtl="0" algn="ctr">
+              <a:lnSpc>
+                <a:spcPct val="100000"/>
+              </a:lnSpc>
+              <a:spcBef>
+                <a:spcPts val="0"/>
+              </a:spcBef>
+              <a:spcAft>
+                <a:spcPts val="0"/>
+              </a:spcAft>
+              <a:buClr>
+                <a:srgbClr val="000000"/>
+              </a:buClr>
+              <a:buSzPts val="1400"/>
+              <a:buFont typeface="Arial"/>
               <a:buNone/>
             </a:pPr>
-            <a:fld id="{00000000-1234-1234-1234-123412341234}" type="slidenum">
+            <a:r>
               <a:rPr lang="pt-BR"/>
-              <a:t>‹#›</a:t>
-            </a:fld>
-            <a:endParaRPr/>
+              <a:t>Saída:</a:t>
+            </a:r>
+            <a:endParaRPr b="0" i="0" sz="1400" u="none" cap="none" strike="noStrike">
+              <a:solidFill>
+                <a:srgbClr val="000000"/>
+              </a:solidFill>
+              <a:latin typeface="Arial"/>
+              <a:ea typeface="Arial"/>
+              <a:cs typeface="Arial"/>
+              <a:sym typeface="Arial"/>
+            </a:endParaRPr>
           </a:p>
         </p:txBody>
       </p:sp>
@@ -13250,7 +13290,7 @@
   <p:cSld>
     <p:spTree>
       <p:nvGrpSpPr>
-        <p:cNvPr id="178" name="Shape 178"/>
+        <p:cNvPr id="177" name="Shape 177"/>
         <p:cNvGrpSpPr/>
         <p:nvPr/>
       </p:nvGrpSpPr>
@@ -13264,7 +13304,7 @@
       </p:grpSpPr>
       <p:sp>
         <p:nvSpPr>
-          <p:cNvPr id="179" name="Google Shape;179;p20"/>
+          <p:cNvPr id="178" name="Google Shape;178;p20"/>
           <p:cNvSpPr txBox="1"/>
           <p:nvPr>
             <p:ph type="title"/>
@@ -13304,7 +13344,7 @@
       </p:sp>
       <p:sp>
         <p:nvSpPr>
-          <p:cNvPr id="180" name="Google Shape;180;p20"/>
+          <p:cNvPr id="179" name="Google Shape;179;p20"/>
           <p:cNvSpPr txBox="1"/>
           <p:nvPr>
             <p:ph idx="1" type="body"/>
@@ -13312,7 +13352,7 @@
         </p:nvSpPr>
         <p:spPr>
           <a:xfrm>
-            <a:off x="727650" y="1393100"/>
+            <a:off x="729438" y="1465675"/>
             <a:ext cx="7688700" cy="410100"/>
           </a:xfrm>
           <a:prstGeom prst="rect">
@@ -13321,7 +13361,7 @@
         </p:spPr>
         <p:txBody>
           <a:bodyPr anchorCtr="0" anchor="t" bIns="91425" lIns="91425" spcFirstLastPara="1" rIns="91425" wrap="square" tIns="91425">
-            <a:noAutofit/>
+            <a:normAutofit/>
           </a:bodyPr>
           <a:lstStyle/>
           <a:p>
@@ -13336,19 +13376,15 @@
             </a:pPr>
             <a:r>
               <a:rPr b="1" lang="pt-BR" sz="1400"/>
-              <a:t>Atribuição: </a:t>
+              <a:t>Concatenação:</a:t>
+            </a:r>
+            <a:r>
+              <a:rPr b="1" lang="pt-BR" sz="1400"/>
+              <a:t> </a:t>
             </a:r>
             <a:r>
               <a:rPr lang="pt-BR" sz="1400"/>
-              <a:t>Se atribuirmos valor a uma string que já tenha algo, </a:t>
-            </a:r>
-            <a:r>
-              <a:rPr lang="pt-BR" sz="1400"/>
-              <a:t>substituiremos</a:t>
-            </a:r>
-            <a:r>
-              <a:rPr lang="pt-BR" sz="1400"/>
-              <a:t> toda a string.</a:t>
+              <a:t>Podemos juntar duas strings na ordem em que foram concatenadas.</a:t>
             </a:r>
             <a:endParaRPr sz="1400"/>
           </a:p>
@@ -13356,13 +13392,79 @@
       </p:sp>
       <p:sp>
         <p:nvSpPr>
+          <p:cNvPr id="180" name="Google Shape;180;p20"/>
+          <p:cNvSpPr txBox="1"/>
+          <p:nvPr/>
+        </p:nvSpPr>
+        <p:spPr>
+          <a:xfrm>
+            <a:off x="1618575" y="1829175"/>
+            <a:ext cx="1814400" cy="400200"/>
+          </a:xfrm>
+          <a:prstGeom prst="rect">
+            <a:avLst/>
+          </a:prstGeom>
+          <a:noFill/>
+          <a:ln>
+            <a:noFill/>
+          </a:ln>
+        </p:spPr>
+        <p:txBody>
+          <a:bodyPr anchorCtr="0" anchor="t" bIns="91425" lIns="91425" spcFirstLastPara="1" rIns="91425" wrap="square" tIns="91425">
+            <a:spAutoFit/>
+          </a:bodyPr>
+          <a:lstStyle/>
+          <a:p>
+            <a:pPr indent="0" lvl="0" marL="0" marR="0" rtl="0" algn="ctr">
+              <a:lnSpc>
+                <a:spcPct val="100000"/>
+              </a:lnSpc>
+              <a:spcBef>
+                <a:spcPts val="0"/>
+              </a:spcBef>
+              <a:spcAft>
+                <a:spcPts val="0"/>
+              </a:spcAft>
+              <a:buClr>
+                <a:srgbClr val="000000"/>
+              </a:buClr>
+              <a:buSzPts val="1400"/>
+              <a:buFont typeface="Arial"/>
+              <a:buNone/>
+            </a:pPr>
+            <a:r>
+              <a:rPr b="0" i="0" lang="pt-BR" sz="1400" u="none" cap="none" strike="noStrike">
+                <a:solidFill>
+                  <a:srgbClr val="000000"/>
+                </a:solidFill>
+                <a:latin typeface="Arial"/>
+                <a:ea typeface="Arial"/>
+                <a:cs typeface="Arial"/>
+                <a:sym typeface="Arial"/>
+              </a:rPr>
+              <a:t>Exemplo:</a:t>
+            </a:r>
+            <a:endParaRPr b="0" i="0" sz="1400" u="none" cap="none" strike="noStrike">
+              <a:solidFill>
+                <a:srgbClr val="000000"/>
+              </a:solidFill>
+              <a:latin typeface="Arial"/>
+              <a:ea typeface="Arial"/>
+              <a:cs typeface="Arial"/>
+              <a:sym typeface="Arial"/>
+            </a:endParaRPr>
+          </a:p>
+        </p:txBody>
+      </p:sp>
+      <p:sp>
+        <p:nvSpPr>
           <p:cNvPr id="181" name="Google Shape;181;p20"/>
           <p:cNvSpPr/>
           <p:nvPr/>
         </p:nvSpPr>
         <p:spPr>
           <a:xfrm>
-            <a:off x="4627921" y="2166150"/>
+            <a:off x="4626084" y="2271613"/>
             <a:ext cx="661500" cy="210300"/>
           </a:xfrm>
           <a:prstGeom prst="rightArrow">
@@ -13430,7 +13532,7 @@
         </p:nvSpPr>
         <p:spPr>
           <a:xfrm>
-            <a:off x="1620400" y="1624300"/>
+            <a:off x="5356338" y="1829175"/>
             <a:ext cx="1814400" cy="400200"/>
           </a:xfrm>
           <a:prstGeom prst="rect">
@@ -13465,16 +13567,8 @@
               <a:buNone/>
             </a:pPr>
             <a:r>
-              <a:rPr b="0" i="0" lang="pt-BR" sz="1400" u="none" cap="none" strike="noStrike">
-                <a:solidFill>
-                  <a:srgbClr val="000000"/>
-                </a:solidFill>
-                <a:latin typeface="Arial"/>
-                <a:ea typeface="Arial"/>
-                <a:cs typeface="Arial"/>
-                <a:sym typeface="Arial"/>
-              </a:rPr>
-              <a:t>Exemplo:</a:t>
+              <a:rPr lang="pt-BR"/>
+              <a:t>Saída:</a:t>
             </a:r>
             <a:endParaRPr b="0" i="0" sz="1400" u="none" cap="none" strike="noStrike">
               <a:solidFill>
@@ -13488,9 +13582,65 @@
           </a:p>
         </p:txBody>
       </p:sp>
-      <p:sp>
-        <p:nvSpPr>
+      <p:pic>
+        <p:nvPicPr>
           <p:cNvPr id="183" name="Google Shape;183;p20"/>
+          <p:cNvPicPr preferRelativeResize="0"/>
+          <p:nvPr/>
+        </p:nvPicPr>
+        <p:blipFill>
+          <a:blip r:embed="rId3">
+            <a:alphaModFix/>
+          </a:blip>
+          <a:stretch>
+            <a:fillRect/>
+          </a:stretch>
+        </p:blipFill>
+        <p:spPr>
+          <a:xfrm>
+            <a:off x="1878088" y="2165475"/>
+            <a:ext cx="1295400" cy="542925"/>
+          </a:xfrm>
+          <a:prstGeom prst="rect">
+            <a:avLst/>
+          </a:prstGeom>
+          <a:noFill/>
+          <a:ln>
+            <a:noFill/>
+          </a:ln>
+        </p:spPr>
+      </p:pic>
+      <p:pic>
+        <p:nvPicPr>
+          <p:cNvPr id="184" name="Google Shape;184;p20"/>
+          <p:cNvPicPr preferRelativeResize="0"/>
+          <p:nvPr/>
+        </p:nvPicPr>
+        <p:blipFill>
+          <a:blip r:embed="rId4">
+            <a:alphaModFix/>
+          </a:blip>
+          <a:stretch>
+            <a:fillRect/>
+          </a:stretch>
+        </p:blipFill>
+        <p:spPr>
+          <a:xfrm>
+            <a:off x="5685200" y="2207713"/>
+            <a:ext cx="1156743" cy="338125"/>
+          </a:xfrm>
+          <a:prstGeom prst="rect">
+            <a:avLst/>
+          </a:prstGeom>
+          <a:noFill/>
+          <a:ln>
+            <a:noFill/>
+          </a:ln>
+        </p:spPr>
+      </p:pic>
+      <p:sp>
+        <p:nvSpPr>
+          <p:cNvPr id="185" name="Google Shape;185;p20"/>
           <p:cNvSpPr txBox="1"/>
           <p:nvPr>
             <p:ph idx="1" type="body"/>
@@ -13498,8 +13648,8 @@
         </p:nvSpPr>
         <p:spPr>
           <a:xfrm>
-            <a:off x="727638" y="2526150"/>
-            <a:ext cx="7688700" cy="410100"/>
+            <a:off x="729450" y="2952538"/>
+            <a:ext cx="7688700" cy="648900"/>
           </a:xfrm>
           <a:prstGeom prst="rect">
             <a:avLst/>
@@ -13521,16 +13671,12 @@
               <a:buNone/>
             </a:pPr>
             <a:r>
+              <a:rPr b="1" lang="pt-BR" sz="1400"/>
+              <a:t>Comparação: </a:t>
+            </a:r>
+            <a:r>
               <a:rPr lang="pt-BR" sz="1400"/>
-              <a:t>Podemos fazer operações de </a:t>
-            </a:r>
-            <a:r>
-              <a:rPr lang="pt-BR" sz="1400"/>
-              <a:t>acréscimo</a:t>
-            </a:r>
-            <a:r>
-              <a:rPr lang="pt-BR" sz="1400"/>
-              <a:t> de strings na string.</a:t>
+              <a:t>Podemos comparar strings sem ter que fazer elemento a elemento usando um laço.</a:t>
             </a:r>
             <a:endParaRPr sz="1400"/>
           </a:p>
@@ -13538,13 +13684,13 @@
       </p:sp>
       <p:sp>
         <p:nvSpPr>
-          <p:cNvPr id="184" name="Google Shape;184;p20"/>
+          <p:cNvPr id="186" name="Google Shape;186;p20"/>
           <p:cNvSpPr txBox="1"/>
           <p:nvPr/>
         </p:nvSpPr>
         <p:spPr>
           <a:xfrm>
-            <a:off x="1618600" y="2753000"/>
+            <a:off x="1618550" y="3480750"/>
             <a:ext cx="1814400" cy="400200"/>
           </a:xfrm>
           <a:prstGeom prst="rect">
@@ -13602,15 +13748,43 @@
           </a:p>
         </p:txBody>
       </p:sp>
-      <p:sp>
-        <p:nvSpPr>
-          <p:cNvPr id="185" name="Google Shape;185;p20"/>
+      <p:pic>
+        <p:nvPicPr>
+          <p:cNvPr id="187" name="Google Shape;187;p20"/>
+          <p:cNvPicPr preferRelativeResize="0"/>
+          <p:nvPr/>
+        </p:nvPicPr>
+        <p:blipFill>
+          <a:blip r:embed="rId5">
+            <a:alphaModFix/>
+          </a:blip>
+          <a:stretch>
+            <a:fillRect/>
+          </a:stretch>
+        </p:blipFill>
+        <p:spPr>
+          <a:xfrm>
+            <a:off x="505615" y="3824775"/>
+            <a:ext cx="4040250" cy="481250"/>
+          </a:xfrm>
+          <a:prstGeom prst="rect">
+            <a:avLst/>
+          </a:prstGeom>
+          <a:noFill/>
+          <a:ln>
+            <a:noFill/>
+          </a:ln>
+        </p:spPr>
+      </p:pic>
+      <p:sp>
+        <p:nvSpPr>
+          <p:cNvPr id="188" name="Google Shape;188;p20"/>
           <p:cNvSpPr/>
           <p:nvPr/>
         </p:nvSpPr>
         <p:spPr>
           <a:xfrm>
-            <a:off x="4626109" y="3195438"/>
+            <a:off x="4626059" y="3960238"/>
             <a:ext cx="661500" cy="210300"/>
           </a:xfrm>
           <a:prstGeom prst="rightArrow">
@@ -13672,13 +13846,13 @@
       </p:sp>
       <p:sp>
         <p:nvSpPr>
-          <p:cNvPr id="186" name="Google Shape;186;p20"/>
+          <p:cNvPr id="189" name="Google Shape;189;p20"/>
           <p:cNvSpPr txBox="1"/>
           <p:nvPr/>
         </p:nvSpPr>
         <p:spPr>
           <a:xfrm>
-            <a:off x="5356363" y="2753000"/>
+            <a:off x="5356350" y="3480750"/>
             <a:ext cx="1814400" cy="400200"/>
           </a:xfrm>
           <a:prstGeom prst="rect">
@@ -13730,149 +13904,7 @@
       </p:sp>
       <p:pic>
         <p:nvPicPr>
-          <p:cNvPr id="187" name="Google Shape;187;p20"/>
-          <p:cNvPicPr preferRelativeResize="0"/>
-          <p:nvPr/>
-        </p:nvPicPr>
-        <p:blipFill>
-          <a:blip r:embed="rId3">
-            <a:alphaModFix/>
-          </a:blip>
-          <a:stretch>
-            <a:fillRect/>
-          </a:stretch>
-        </p:blipFill>
-        <p:spPr>
-          <a:xfrm>
-            <a:off x="1908663" y="1952700"/>
-            <a:ext cx="1237924" cy="573450"/>
-          </a:xfrm>
-          <a:prstGeom prst="rect">
-            <a:avLst/>
-          </a:prstGeom>
-          <a:noFill/>
-          <a:ln>
-            <a:noFill/>
-          </a:ln>
-        </p:spPr>
-      </p:pic>
-      <p:pic>
-        <p:nvPicPr>
-          <p:cNvPr id="188" name="Google Shape;188;p20"/>
-          <p:cNvPicPr preferRelativeResize="0"/>
-          <p:nvPr/>
-        </p:nvPicPr>
-        <p:blipFill>
-          <a:blip r:embed="rId4">
-            <a:alphaModFix/>
-          </a:blip>
-          <a:stretch>
-            <a:fillRect/>
-          </a:stretch>
-        </p:blipFill>
-        <p:spPr>
-          <a:xfrm>
-            <a:off x="5893463" y="2102250"/>
-            <a:ext cx="743875" cy="338125"/>
-          </a:xfrm>
-          <a:prstGeom prst="rect">
-            <a:avLst/>
-          </a:prstGeom>
-          <a:noFill/>
-          <a:ln>
-            <a:noFill/>
-          </a:ln>
-        </p:spPr>
-      </p:pic>
-      <p:sp>
-        <p:nvSpPr>
-          <p:cNvPr id="189" name="Google Shape;189;p20"/>
-          <p:cNvSpPr txBox="1"/>
-          <p:nvPr/>
-        </p:nvSpPr>
-        <p:spPr>
-          <a:xfrm>
-            <a:off x="5358200" y="1775575"/>
-            <a:ext cx="1814400" cy="400200"/>
-          </a:xfrm>
-          <a:prstGeom prst="rect">
-            <a:avLst/>
-          </a:prstGeom>
-          <a:noFill/>
-          <a:ln>
-            <a:noFill/>
-          </a:ln>
-        </p:spPr>
-        <p:txBody>
-          <a:bodyPr anchorCtr="0" anchor="t" bIns="91425" lIns="91425" spcFirstLastPara="1" rIns="91425" wrap="square" tIns="91425">
-            <a:spAutoFit/>
-          </a:bodyPr>
-          <a:lstStyle/>
-          <a:p>
-            <a:pPr indent="0" lvl="0" marL="0" marR="0" rtl="0" algn="ctr">
-              <a:lnSpc>
-                <a:spcPct val="100000"/>
-              </a:lnSpc>
-              <a:spcBef>
-                <a:spcPts val="0"/>
-              </a:spcBef>
-              <a:spcAft>
-                <a:spcPts val="0"/>
-              </a:spcAft>
-              <a:buClr>
-                <a:srgbClr val="000000"/>
-              </a:buClr>
-              <a:buSzPts val="1400"/>
-              <a:buFont typeface="Arial"/>
-              <a:buNone/>
-            </a:pPr>
-            <a:r>
-              <a:rPr lang="pt-BR"/>
-              <a:t>Saída:</a:t>
-            </a:r>
-            <a:endParaRPr b="0" i="0" sz="1400" u="none" cap="none" strike="noStrike">
-              <a:solidFill>
-                <a:srgbClr val="000000"/>
-              </a:solidFill>
-              <a:latin typeface="Arial"/>
-              <a:ea typeface="Arial"/>
-              <a:cs typeface="Arial"/>
-              <a:sym typeface="Arial"/>
-            </a:endParaRPr>
-          </a:p>
-        </p:txBody>
-      </p:sp>
-      <p:pic>
-        <p:nvPicPr>
           <p:cNvPr id="190" name="Google Shape;190;p20"/>
-          <p:cNvPicPr preferRelativeResize="0"/>
-          <p:nvPr/>
-        </p:nvPicPr>
-        <p:blipFill>
-          <a:blip r:embed="rId5">
-            <a:alphaModFix/>
-          </a:blip>
-          <a:stretch>
-            <a:fillRect/>
-          </a:stretch>
-        </p:blipFill>
-        <p:spPr>
-          <a:xfrm>
-            <a:off x="1878113" y="3089300"/>
-            <a:ext cx="1295400" cy="542925"/>
-          </a:xfrm>
-          <a:prstGeom prst="rect">
-            <a:avLst/>
-          </a:prstGeom>
-          <a:noFill/>
-          <a:ln>
-            <a:noFill/>
-          </a:ln>
-        </p:spPr>
-      </p:pic>
-      <p:pic>
-        <p:nvPicPr>
-          <p:cNvPr id="191" name="Google Shape;191;p20"/>
           <p:cNvPicPr preferRelativeResize="0"/>
           <p:nvPr/>
         </p:nvPicPr>
@@ -13886,8 +13918,8 @@
         </p:blipFill>
         <p:spPr>
           <a:xfrm>
-            <a:off x="5685225" y="3131538"/>
-            <a:ext cx="1156743" cy="338125"/>
+            <a:off x="5685188" y="3882900"/>
+            <a:ext cx="1156725" cy="316911"/>
           </a:xfrm>
           <a:prstGeom prst="rect">
             <a:avLst/>
@@ -13900,299 +13932,7 @@
       </p:pic>
       <p:sp>
         <p:nvSpPr>
-          <p:cNvPr id="192" name="Google Shape;192;p20"/>
-          <p:cNvSpPr txBox="1"/>
-          <p:nvPr>
-            <p:ph idx="1" type="body"/>
-          </p:nvPr>
-        </p:nvSpPr>
-        <p:spPr>
-          <a:xfrm>
-            <a:off x="725850" y="3664975"/>
-            <a:ext cx="7688700" cy="648900"/>
-          </a:xfrm>
-          <a:prstGeom prst="rect">
-            <a:avLst/>
-          </a:prstGeom>
-        </p:spPr>
-        <p:txBody>
-          <a:bodyPr anchorCtr="0" anchor="t" bIns="91425" lIns="91425" spcFirstLastPara="1" rIns="91425" wrap="square" tIns="91425">
-            <a:normAutofit/>
-          </a:bodyPr>
-          <a:lstStyle/>
-          <a:p>
-            <a:pPr indent="457200" lvl="0" marL="0" rtl="0" algn="just">
-              <a:spcBef>
-                <a:spcPts val="0"/>
-              </a:spcBef>
-              <a:spcAft>
-                <a:spcPts val="1200"/>
-              </a:spcAft>
-              <a:buNone/>
-            </a:pPr>
-            <a:r>
-              <a:rPr b="1" lang="pt-BR" sz="1400"/>
-              <a:t>Comparação: </a:t>
-            </a:r>
-            <a:r>
-              <a:rPr lang="pt-BR" sz="1400"/>
-              <a:t>Podemos comparar strings sem ter que fazer elemento a elemento usando um laço.</a:t>
-            </a:r>
-            <a:endParaRPr sz="1400"/>
-          </a:p>
-        </p:txBody>
-      </p:sp>
-      <p:sp>
-        <p:nvSpPr>
-          <p:cNvPr id="193" name="Google Shape;193;p20"/>
-          <p:cNvSpPr txBox="1"/>
-          <p:nvPr/>
-        </p:nvSpPr>
-        <p:spPr>
-          <a:xfrm>
-            <a:off x="1618600" y="3911750"/>
-            <a:ext cx="1814400" cy="400200"/>
-          </a:xfrm>
-          <a:prstGeom prst="rect">
-            <a:avLst/>
-          </a:prstGeom>
-          <a:noFill/>
-          <a:ln>
-            <a:noFill/>
-          </a:ln>
-        </p:spPr>
-        <p:txBody>
-          <a:bodyPr anchorCtr="0" anchor="t" bIns="91425" lIns="91425" spcFirstLastPara="1" rIns="91425" wrap="square" tIns="91425">
-            <a:spAutoFit/>
-          </a:bodyPr>
-          <a:lstStyle/>
-          <a:p>
-            <a:pPr indent="0" lvl="0" marL="0" marR="0" rtl="0" algn="ctr">
-              <a:lnSpc>
-                <a:spcPct val="100000"/>
-              </a:lnSpc>
-              <a:spcBef>
-                <a:spcPts val="0"/>
-              </a:spcBef>
-              <a:spcAft>
-                <a:spcPts val="0"/>
-              </a:spcAft>
-              <a:buClr>
-                <a:srgbClr val="000000"/>
-              </a:buClr>
-              <a:buSzPts val="1400"/>
-              <a:buFont typeface="Arial"/>
-              <a:buNone/>
-            </a:pPr>
-            <a:r>
-              <a:rPr b="0" i="0" lang="pt-BR" sz="1400" u="none" cap="none" strike="noStrike">
-                <a:solidFill>
-                  <a:srgbClr val="000000"/>
-                </a:solidFill>
-                <a:latin typeface="Arial"/>
-                <a:ea typeface="Arial"/>
-                <a:cs typeface="Arial"/>
-                <a:sym typeface="Arial"/>
-              </a:rPr>
-              <a:t>Exemplo:</a:t>
-            </a:r>
-            <a:endParaRPr b="0" i="0" sz="1400" u="none" cap="none" strike="noStrike">
-              <a:solidFill>
-                <a:srgbClr val="000000"/>
-              </a:solidFill>
-              <a:latin typeface="Arial"/>
-              <a:ea typeface="Arial"/>
-              <a:cs typeface="Arial"/>
-              <a:sym typeface="Arial"/>
-            </a:endParaRPr>
-          </a:p>
-        </p:txBody>
-      </p:sp>
-      <p:pic>
-        <p:nvPicPr>
-          <p:cNvPr id="194" name="Google Shape;194;p20"/>
-          <p:cNvPicPr preferRelativeResize="0"/>
-          <p:nvPr/>
-        </p:nvPicPr>
-        <p:blipFill>
-          <a:blip r:embed="rId7">
-            <a:alphaModFix/>
-          </a:blip>
-          <a:stretch>
-            <a:fillRect/>
-          </a:stretch>
-        </p:blipFill>
-        <p:spPr>
-          <a:xfrm>
-            <a:off x="505665" y="4255775"/>
-            <a:ext cx="4040250" cy="481250"/>
-          </a:xfrm>
-          <a:prstGeom prst="rect">
-            <a:avLst/>
-          </a:prstGeom>
-          <a:noFill/>
-          <a:ln>
-            <a:noFill/>
-          </a:ln>
-        </p:spPr>
-      </p:pic>
-      <p:sp>
-        <p:nvSpPr>
-          <p:cNvPr id="195" name="Google Shape;195;p20"/>
-          <p:cNvSpPr/>
-          <p:nvPr/>
-        </p:nvSpPr>
-        <p:spPr>
-          <a:xfrm>
-            <a:off x="4626109" y="4391238"/>
-            <a:ext cx="661500" cy="210300"/>
-          </a:xfrm>
-          <a:prstGeom prst="rightArrow">
-            <a:avLst>
-              <a:gd fmla="val 50000" name="adj1"/>
-              <a:gd fmla="val 50000" name="adj2"/>
-            </a:avLst>
-          </a:prstGeom>
-          <a:solidFill>
-            <a:srgbClr val="EEEEEE"/>
-          </a:solidFill>
-          <a:ln cap="flat" cmpd="sng" w="9525">
-            <a:solidFill>
-              <a:srgbClr val="595959"/>
-            </a:solidFill>
-            <a:prstDash val="solid"/>
-            <a:round/>
-            <a:headEnd len="sm" w="sm" type="none"/>
-            <a:tailEnd len="sm" w="sm" type="none"/>
-          </a:ln>
-        </p:spPr>
-        <p:txBody>
-          <a:bodyPr anchorCtr="0" anchor="ctr" bIns="91425" lIns="91425" spcFirstLastPara="1" rIns="91425" wrap="square" tIns="91425">
-            <a:noAutofit/>
-          </a:bodyPr>
-          <a:lstStyle/>
-          <a:p>
-            <a:pPr indent="0" lvl="0" marL="0" marR="0" rtl="0" algn="l">
-              <a:lnSpc>
-                <a:spcPct val="100000"/>
-              </a:lnSpc>
-              <a:spcBef>
-                <a:spcPts val="0"/>
-              </a:spcBef>
-              <a:spcAft>
-                <a:spcPts val="0"/>
-              </a:spcAft>
-              <a:buClr>
-                <a:srgbClr val="000000"/>
-              </a:buClr>
-              <a:buSzPts val="1400"/>
-              <a:buFont typeface="Arial"/>
-              <a:buNone/>
-            </a:pPr>
-            <a:r>
-              <a:t/>
-            </a:r>
-            <a:endParaRPr b="0" i="0" sz="1400" u="none" cap="none" strike="noStrike">
-              <a:solidFill>
-                <a:srgbClr val="000000"/>
-              </a:solidFill>
-              <a:latin typeface="Arial"/>
-              <a:ea typeface="Arial"/>
-              <a:cs typeface="Arial"/>
-              <a:sym typeface="Arial"/>
-            </a:endParaRPr>
-          </a:p>
-        </p:txBody>
-      </p:sp>
-      <p:sp>
-        <p:nvSpPr>
-          <p:cNvPr id="196" name="Google Shape;196;p20"/>
-          <p:cNvSpPr txBox="1"/>
-          <p:nvPr/>
-        </p:nvSpPr>
-        <p:spPr>
-          <a:xfrm>
-            <a:off x="5356400" y="3911750"/>
-            <a:ext cx="1814400" cy="400200"/>
-          </a:xfrm>
-          <a:prstGeom prst="rect">
-            <a:avLst/>
-          </a:prstGeom>
-          <a:noFill/>
-          <a:ln>
-            <a:noFill/>
-          </a:ln>
-        </p:spPr>
-        <p:txBody>
-          <a:bodyPr anchorCtr="0" anchor="t" bIns="91425" lIns="91425" spcFirstLastPara="1" rIns="91425" wrap="square" tIns="91425">
-            <a:spAutoFit/>
-          </a:bodyPr>
-          <a:lstStyle/>
-          <a:p>
-            <a:pPr indent="0" lvl="0" marL="0" marR="0" rtl="0" algn="ctr">
-              <a:lnSpc>
-                <a:spcPct val="100000"/>
-              </a:lnSpc>
-              <a:spcBef>
-                <a:spcPts val="0"/>
-              </a:spcBef>
-              <a:spcAft>
-                <a:spcPts val="0"/>
-              </a:spcAft>
-              <a:buClr>
-                <a:srgbClr val="000000"/>
-              </a:buClr>
-              <a:buSzPts val="1400"/>
-              <a:buFont typeface="Arial"/>
-              <a:buNone/>
-            </a:pPr>
-            <a:r>
-              <a:rPr lang="pt-BR"/>
-              <a:t>Saída:</a:t>
-            </a:r>
-            <a:endParaRPr b="0" i="0" sz="1400" u="none" cap="none" strike="noStrike">
-              <a:solidFill>
-                <a:srgbClr val="000000"/>
-              </a:solidFill>
-              <a:latin typeface="Arial"/>
-              <a:ea typeface="Arial"/>
-              <a:cs typeface="Arial"/>
-              <a:sym typeface="Arial"/>
-            </a:endParaRPr>
-          </a:p>
-        </p:txBody>
-      </p:sp>
-      <p:pic>
-        <p:nvPicPr>
-          <p:cNvPr id="197" name="Google Shape;197;p20"/>
-          <p:cNvPicPr preferRelativeResize="0"/>
-          <p:nvPr/>
-        </p:nvPicPr>
-        <p:blipFill>
-          <a:blip r:embed="rId8">
-            <a:alphaModFix/>
-          </a:blip>
-          <a:stretch>
-            <a:fillRect/>
-          </a:stretch>
-        </p:blipFill>
-        <p:spPr>
-          <a:xfrm>
-            <a:off x="5685238" y="4313900"/>
-            <a:ext cx="1156725" cy="316911"/>
-          </a:xfrm>
-          <a:prstGeom prst="rect">
-            <a:avLst/>
-          </a:prstGeom>
-          <a:noFill/>
-          <a:ln>
-            <a:noFill/>
-          </a:ln>
-        </p:spPr>
-      </p:pic>
-      <p:sp>
-        <p:nvSpPr>
-          <p:cNvPr id="198" name="Google Shape;198;p20"/>
+          <p:cNvPr id="191" name="Google Shape;191;p20"/>
           <p:cNvSpPr txBox="1"/>
           <p:nvPr>
             <p:ph idx="12" type="sldNum"/>
@@ -14243,7 +13983,7 @@
   <p:cSld>
     <p:spTree>
       <p:nvGrpSpPr>
-        <p:cNvPr id="202" name="Shape 202"/>
+        <p:cNvPr id="195" name="Shape 195"/>
         <p:cNvGrpSpPr/>
         <p:nvPr/>
       </p:nvGrpSpPr>
@@ -14257,7 +13997,7 @@
       </p:grpSpPr>
       <p:sp>
         <p:nvSpPr>
-          <p:cNvPr id="203" name="Google Shape;203;p21"/>
+          <p:cNvPr id="196" name="Google Shape;196;p21"/>
           <p:cNvSpPr txBox="1"/>
           <p:nvPr>
             <p:ph type="title"/>
@@ -14297,7 +14037,7 @@
       </p:sp>
       <p:sp>
         <p:nvSpPr>
-          <p:cNvPr id="204" name="Google Shape;204;p21"/>
+          <p:cNvPr id="197" name="Google Shape;197;p21"/>
           <p:cNvSpPr txBox="1"/>
           <p:nvPr>
             <p:ph idx="1" type="body"/>
@@ -14333,7 +14073,7 @@
             </a:r>
             <a:r>
               <a:rPr lang="pt-BR" sz="1400"/>
-              <a:t>Ao usar o comando cin na string, a string é computada até encontrar o término de uma palavra contínua. No exemplo abaixo apenas “duas” foi guardada na string.</a:t>
+              <a:t>Ao usar o comando cin na string, a string é computada até encontrar espaço em branco ou quebra de linha. No exemplo abaixo apenas “duas” foi guardada na string.</a:t>
             </a:r>
             <a:endParaRPr sz="1400"/>
           </a:p>
@@ -14341,7 +14081,7 @@
       </p:sp>
       <p:sp>
         <p:nvSpPr>
-          <p:cNvPr id="205" name="Google Shape;205;p21"/>
+          <p:cNvPr id="198" name="Google Shape;198;p21"/>
           <p:cNvSpPr txBox="1"/>
           <p:nvPr>
             <p:ph idx="1" type="body"/>
@@ -14385,7 +14125,7 @@
       </p:sp>
       <p:pic>
         <p:nvPicPr>
-          <p:cNvPr id="206" name="Google Shape;206;p21"/>
+          <p:cNvPr id="199" name="Google Shape;199;p21"/>
           <p:cNvPicPr preferRelativeResize="0"/>
           <p:nvPr/>
         </p:nvPicPr>
@@ -14413,7 +14153,7 @@
       </p:pic>
       <p:sp>
         <p:nvSpPr>
-          <p:cNvPr id="207" name="Google Shape;207;p21"/>
+          <p:cNvPr id="200" name="Google Shape;200;p21"/>
           <p:cNvSpPr txBox="1"/>
           <p:nvPr/>
         </p:nvSpPr>
@@ -14479,7 +14219,7 @@
       </p:sp>
       <p:sp>
         <p:nvSpPr>
-          <p:cNvPr id="208" name="Google Shape;208;p21"/>
+          <p:cNvPr id="201" name="Google Shape;201;p21"/>
           <p:cNvSpPr/>
           <p:nvPr/>
         </p:nvSpPr>
@@ -14547,7 +14287,7 @@
       </p:sp>
       <p:sp>
         <p:nvSpPr>
-          <p:cNvPr id="209" name="Google Shape;209;p21"/>
+          <p:cNvPr id="202" name="Google Shape;202;p21"/>
           <p:cNvSpPr txBox="1"/>
           <p:nvPr/>
         </p:nvSpPr>
@@ -14605,7 +14345,7 @@
       </p:sp>
       <p:pic>
         <p:nvPicPr>
-          <p:cNvPr id="210" name="Google Shape;210;p21"/>
+          <p:cNvPr id="203" name="Google Shape;203;p21"/>
           <p:cNvPicPr preferRelativeResize="0"/>
           <p:nvPr/>
         </p:nvPicPr>
@@ -14633,7 +14373,7 @@
       </p:pic>
       <p:sp>
         <p:nvSpPr>
-          <p:cNvPr id="211" name="Google Shape;211;p21"/>
+          <p:cNvPr id="204" name="Google Shape;204;p21"/>
           <p:cNvSpPr/>
           <p:nvPr/>
         </p:nvSpPr>
@@ -14701,7 +14441,7 @@
       </p:sp>
       <p:sp>
         <p:nvSpPr>
-          <p:cNvPr id="212" name="Google Shape;212;p21"/>
+          <p:cNvPr id="205" name="Google Shape;205;p21"/>
           <p:cNvSpPr txBox="1"/>
           <p:nvPr/>
         </p:nvSpPr>
@@ -14759,7 +14499,7 @@
       </p:sp>
       <p:pic>
         <p:nvPicPr>
-          <p:cNvPr id="213" name="Google Shape;213;p21"/>
+          <p:cNvPr id="206" name="Google Shape;206;p21"/>
           <p:cNvPicPr preferRelativeResize="0"/>
           <p:nvPr/>
         </p:nvPicPr>
@@ -14787,7 +14527,7 @@
       </p:pic>
       <p:pic>
         <p:nvPicPr>
-          <p:cNvPr id="214" name="Google Shape;214;p21"/>
+          <p:cNvPr id="207" name="Google Shape;207;p21"/>
           <p:cNvPicPr preferRelativeResize="0"/>
           <p:nvPr/>
         </p:nvPicPr>
@@ -14815,7 +14555,7 @@
       </p:pic>
       <p:sp>
         <p:nvSpPr>
-          <p:cNvPr id="215" name="Google Shape;215;p21"/>
+          <p:cNvPr id="208" name="Google Shape;208;p21"/>
           <p:cNvSpPr txBox="1"/>
           <p:nvPr/>
         </p:nvSpPr>
@@ -14881,7 +14621,7 @@
       </p:sp>
       <p:sp>
         <p:nvSpPr>
-          <p:cNvPr id="216" name="Google Shape;216;p21"/>
+          <p:cNvPr id="209" name="Google Shape;209;p21"/>
           <p:cNvSpPr/>
           <p:nvPr/>
         </p:nvSpPr>
@@ -14949,7 +14689,7 @@
       </p:sp>
       <p:sp>
         <p:nvSpPr>
-          <p:cNvPr id="217" name="Google Shape;217;p21"/>
+          <p:cNvPr id="210" name="Google Shape;210;p21"/>
           <p:cNvSpPr txBox="1"/>
           <p:nvPr/>
         </p:nvSpPr>
@@ -15007,7 +14747,7 @@
       </p:sp>
       <p:pic>
         <p:nvPicPr>
-          <p:cNvPr id="218" name="Google Shape;218;p21"/>
+          <p:cNvPr id="211" name="Google Shape;211;p21"/>
           <p:cNvPicPr preferRelativeResize="0"/>
           <p:nvPr/>
         </p:nvPicPr>
@@ -15035,7 +14775,7 @@
       </p:pic>
       <p:sp>
         <p:nvSpPr>
-          <p:cNvPr id="219" name="Google Shape;219;p21"/>
+          <p:cNvPr id="212" name="Google Shape;212;p21"/>
           <p:cNvSpPr/>
           <p:nvPr/>
         </p:nvSpPr>
@@ -15103,7 +14843,7 @@
       </p:sp>
       <p:sp>
         <p:nvSpPr>
-          <p:cNvPr id="220" name="Google Shape;220;p21"/>
+          <p:cNvPr id="213" name="Google Shape;213;p21"/>
           <p:cNvSpPr txBox="1"/>
           <p:nvPr/>
         </p:nvSpPr>
@@ -15161,7 +14901,7 @@
       </p:sp>
       <p:pic>
         <p:nvPicPr>
-          <p:cNvPr id="221" name="Google Shape;221;p21"/>
+          <p:cNvPr id="214" name="Google Shape;214;p21"/>
           <p:cNvPicPr preferRelativeResize="0"/>
           <p:nvPr/>
         </p:nvPicPr>
@@ -15189,7 +14929,7 @@
       </p:pic>
       <p:sp>
         <p:nvSpPr>
-          <p:cNvPr id="222" name="Google Shape;222;p21"/>
+          <p:cNvPr id="215" name="Google Shape;215;p21"/>
           <p:cNvSpPr txBox="1"/>
           <p:nvPr>
             <p:ph idx="12" type="sldNum"/>
@@ -15236,6 +14976,285 @@
 </file>
 
 <file path=ppt/theme/theme1.xml><?xml version="1.0" encoding="utf-8"?>
+<a:theme xmlns:a="http://schemas.openxmlformats.org/drawingml/2006/main" xmlns:r="http://schemas.openxmlformats.org/officeDocument/2006/relationships">
+  <a:themeElements>
+    <a:clrScheme name="Default">
+      <a:dk1>
+        <a:srgbClr val="000000"/>
+      </a:dk1>
+      <a:lt1>
+        <a:srgbClr val="FFFFFF"/>
+      </a:lt1>
+      <a:dk2>
+        <a:srgbClr val="158158"/>
+      </a:dk2>
+      <a:lt2>
+        <a:srgbClr val="F3F3F3"/>
+      </a:lt2>
+      <a:accent1>
+        <a:srgbClr val="058DC7"/>
+      </a:accent1>
+      <a:accent2>
+        <a:srgbClr val="50B432"/>
+      </a:accent2>
+      <a:accent3>
+        <a:srgbClr val="ED561B"/>
+      </a:accent3>
+      <a:accent4>
+        <a:srgbClr val="EDEF00"/>
+      </a:accent4>
+      <a:accent5>
+        <a:srgbClr val="24CBE5"/>
+      </a:accent5>
+      <a:accent6>
+        <a:srgbClr val="64E572"/>
+      </a:accent6>
+      <a:hlink>
+        <a:srgbClr val="2200CC"/>
+      </a:hlink>
+      <a:folHlink>
+        <a:srgbClr val="551A8B"/>
+      </a:folHlink>
+    </a:clrScheme>
+    <a:fontScheme name="Office">
+      <a:majorFont>
+        <a:latin typeface="Arial"/>
+        <a:ea typeface=""/>
+        <a:cs typeface=""/>
+        <a:font script="Jpan" typeface="ＭＳ Ｐゴシック"/>
+        <a:font script="Hang" typeface="맑은 고딕"/>
+        <a:font script="Hans" typeface="宋体"/>
+        <a:font script="Hant" typeface="新細明體"/>
+        <a:font script="Arab" typeface="Times New Roman"/>
+        <a:font script="Hebr" typeface="Times New Roman"/>
+        <a:font script="Thai" typeface="Angsana New"/>
+        <a:font script="Ethi" typeface="Nyala"/>
+        <a:font script="Beng" typeface="Vrinda"/>
+        <a:font script="Gujr" typeface="Shruti"/>
+        <a:font script="Khmr" typeface="MoolBoran"/>
+        <a:font script="Knda" typeface="Tunga"/>
+        <a:font script="Guru" typeface="Raavi"/>
+        <a:font script="Cans" typeface="Euphemia"/>
+        <a:font script="Cher" typeface="Plantagenet Cherokee"/>
+        <a:font script="Yiii" typeface="Microsoft Yi Baiti"/>
+        <a:font script="Tibt" typeface="Microsoft Himalaya"/>
+        <a:font script="Thaa" typeface="MV Boli"/>
+        <a:font script="Deva" typeface="Mangal"/>
+        <a:font script="Telu" typeface="Gautami"/>
+        <a:font script="Taml" typeface="Latha"/>
+        <a:font script="Syrc" typeface="Estrangelo Edessa"/>
+        <a:font script="Orya" typeface="Kalinga"/>
+        <a:font script="Mlym" typeface="Kartika"/>
+        <a:font script="Laoo" typeface="DokChampa"/>
+        <a:font script="Sinh" typeface="Iskoola Pota"/>
+        <a:font script="Mong" typeface="Mongolian Baiti"/>
+        <a:font script="Viet" typeface="Times New Roman"/>
+        <a:font script="Uigh" typeface="Microsoft Uighur"/>
+        <a:font script="Geor" typeface="Sylfaen"/>
+      </a:majorFont>
+      <a:minorFont>
+        <a:latin typeface="Arial"/>
+        <a:ea typeface=""/>
+        <a:cs typeface=""/>
+        <a:font script="Jpan" typeface="ＭＳ Ｐゴシック"/>
+        <a:font script="Hang" typeface="맑은 고딕"/>
+        <a:font script="Hans" typeface="宋体"/>
+        <a:font script="Hant" typeface="新細明體"/>
+        <a:font script="Arab" typeface="Arial"/>
+        <a:font script="Hebr" typeface="Arial"/>
+        <a:font script="Thai" typeface="Cordia New"/>
+        <a:font script="Ethi" typeface="Nyala"/>
+        <a:font script="Beng" typeface="Vrinda"/>
+        <a:font script="Gujr" typeface="Shruti"/>
+        <a:font script="Khmr" typeface="DaunPenh"/>
+        <a:font script="Knda" typeface="Tunga"/>
+        <a:font script="Guru" typeface="Raavi"/>
+        <a:font script="Cans" typeface="Euphemia"/>
+        <a:font script="Cher" typeface="Plantagenet Cherokee"/>
+        <a:font script="Yiii" typeface="Microsoft Yi Baiti"/>
+        <a:font script="Tibt" typeface="Microsoft Himalaya"/>
+        <a:font script="Thaa" typeface="MV Boli"/>
+        <a:font script="Deva" typeface="Mangal"/>
+        <a:font script="Telu" typeface="Gautami"/>
+        <a:font script="Taml" typeface="Latha"/>
+        <a:font script="Syrc" typeface="Estrangelo Edessa"/>
+        <a:font script="Orya" typeface="Kalinga"/>
+        <a:font script="Mlym" typeface="Kartika"/>
+        <a:font script="Laoo" typeface="DokChampa"/>
+        <a:font script="Sinh" typeface="Iskoola Pota"/>
+        <a:font script="Mong" typeface="Mongolian Baiti"/>
+        <a:font script="Viet" typeface="Arial"/>
+        <a:font script="Uigh" typeface="Microsoft Uighur"/>
+        <a:font script="Geor" typeface="Sylfaen"/>
+      </a:minorFont>
+    </a:fontScheme>
+    <a:fmtScheme name="Office">
+      <a:fillStyleLst>
+        <a:solidFill>
+          <a:schemeClr val="phClr"/>
+        </a:solidFill>
+        <a:gradFill rotWithShape="1">
+          <a:gsLst>
+            <a:gs pos="0">
+              <a:schemeClr val="phClr">
+                <a:tint val="50000"/>
+                <a:satMod val="300000"/>
+              </a:schemeClr>
+            </a:gs>
+            <a:gs pos="35000">
+              <a:schemeClr val="phClr">
+                <a:tint val="37000"/>
+                <a:satMod val="300000"/>
+              </a:schemeClr>
+            </a:gs>
+            <a:gs pos="100000">
+              <a:schemeClr val="phClr">
+                <a:tint val="15000"/>
+                <a:satMod val="350000"/>
+              </a:schemeClr>
+            </a:gs>
+          </a:gsLst>
+          <a:lin ang="16200000" scaled="1"/>
+        </a:gradFill>
+        <a:gradFill rotWithShape="1">
+          <a:gsLst>
+            <a:gs pos="0">
+              <a:schemeClr val="phClr">
+                <a:tint val="100000"/>
+                <a:shade val="100000"/>
+                <a:satMod val="130000"/>
+              </a:schemeClr>
+            </a:gs>
+            <a:gs pos="100000">
+              <a:schemeClr val="phClr">
+                <a:tint val="50000"/>
+                <a:shade val="100000"/>
+                <a:satMod val="350000"/>
+              </a:schemeClr>
+            </a:gs>
+          </a:gsLst>
+          <a:lin ang="16200000" scaled="0"/>
+        </a:gradFill>
+      </a:fillStyleLst>
+      <a:lnStyleLst>
+        <a:ln w="9525" cap="flat" cmpd="sng" algn="ctr">
+          <a:solidFill>
+            <a:schemeClr val="phClr">
+              <a:shade val="95000"/>
+              <a:satMod val="105000"/>
+            </a:schemeClr>
+          </a:solidFill>
+          <a:prstDash val="solid"/>
+        </a:ln>
+        <a:ln w="25400" cap="flat" cmpd="sng" algn="ctr">
+          <a:solidFill>
+            <a:schemeClr val="phClr"/>
+          </a:solidFill>
+          <a:prstDash val="solid"/>
+        </a:ln>
+        <a:ln w="38100" cap="flat" cmpd="sng" algn="ctr">
+          <a:solidFill>
+            <a:schemeClr val="phClr"/>
+          </a:solidFill>
+          <a:prstDash val="solid"/>
+        </a:ln>
+      </a:lnStyleLst>
+      <a:effectStyleLst>
+        <a:effectStyle>
+          <a:effectLst>
+            <a:outerShdw blurRad="40000" dist="20000" dir="5400000" rotWithShape="0">
+              <a:srgbClr val="000000">
+                <a:alpha val="38000"/>
+              </a:srgbClr>
+            </a:outerShdw>
+          </a:effectLst>
+        </a:effectStyle>
+        <a:effectStyle>
+          <a:effectLst>
+            <a:outerShdw blurRad="40000" dist="23000" dir="5400000" rotWithShape="0">
+              <a:srgbClr val="000000">
+                <a:alpha val="35000"/>
+              </a:srgbClr>
+            </a:outerShdw>
+          </a:effectLst>
+        </a:effectStyle>
+        <a:effectStyle>
+          <a:effectLst>
+            <a:outerShdw blurRad="40000" dist="23000" dir="5400000" rotWithShape="0">
+              <a:srgbClr val="000000">
+                <a:alpha val="35000"/>
+              </a:srgbClr>
+            </a:outerShdw>
+          </a:effectLst>
+          <a:scene3d>
+            <a:camera prst="orthographicFront">
+              <a:rot lat="0" lon="0" rev="0"/>
+            </a:camera>
+            <a:lightRig rig="threePt" dir="t">
+              <a:rot lat="0" lon="0" rev="1200000"/>
+            </a:lightRig>
+          </a:scene3d>
+          <a:sp3d>
+            <a:bevelT w="63500" h="25400"/>
+          </a:sp3d>
+        </a:effectStyle>
+      </a:effectStyleLst>
+      <a:bgFillStyleLst>
+        <a:solidFill>
+          <a:schemeClr val="phClr"/>
+        </a:solidFill>
+        <a:gradFill rotWithShape="1">
+          <a:gsLst>
+            <a:gs pos="0">
+              <a:schemeClr val="phClr">
+                <a:tint val="40000"/>
+                <a:satMod val="350000"/>
+              </a:schemeClr>
+            </a:gs>
+            <a:gs pos="40000">
+              <a:schemeClr val="phClr">
+                <a:tint val="45000"/>
+                <a:shade val="99000"/>
+                <a:satMod val="350000"/>
+              </a:schemeClr>
+            </a:gs>
+            <a:gs pos="100000">
+              <a:schemeClr val="phClr">
+                <a:shade val="20000"/>
+                <a:satMod val="255000"/>
+              </a:schemeClr>
+            </a:gs>
+          </a:gsLst>
+          <a:path path="circle">
+            <a:fillToRect l="50000" t="-80000" r="50000" b="180000"/>
+          </a:path>
+        </a:gradFill>
+        <a:gradFill rotWithShape="1">
+          <a:gsLst>
+            <a:gs pos="0">
+              <a:schemeClr val="phClr">
+                <a:tint val="80000"/>
+                <a:satMod val="300000"/>
+              </a:schemeClr>
+            </a:gs>
+            <a:gs pos="100000">
+              <a:schemeClr val="phClr">
+                <a:shade val="30000"/>
+                <a:satMod val="200000"/>
+              </a:schemeClr>
+            </a:gs>
+          </a:gsLst>
+          <a:path path="circle">
+            <a:fillToRect l="50000" t="50000" r="50000" b="50000"/>
+          </a:path>
+        </a:gradFill>
+      </a:bgFillStyleLst>
+    </a:fmtScheme>
+  </a:themeElements>
+</a:theme>
+</file>
+
+<file path=ppt/theme/theme2.xml><?xml version="1.0" encoding="utf-8"?>
 <a:theme xmlns:a="http://schemas.openxmlformats.org/drawingml/2006/main" xmlns:r="http://schemas.openxmlformats.org/officeDocument/2006/relationships" name="Streamline">
   <a:themeElements>
     <a:clrScheme name="Streamline">
@@ -15512,283 +15531,4 @@
     </a:fmtScheme>
   </a:themeElements>
 </a:theme>
-</file>
-
-<file path=ppt/theme/theme2.xml><?xml version="1.0" encoding="utf-8"?>
-<a:theme xmlns:a="http://schemas.openxmlformats.org/drawingml/2006/main" xmlns:r="http://schemas.openxmlformats.org/officeDocument/2006/relationships">
-  <a:themeElements>
-    <a:clrScheme name="Default">
-      <a:dk1>
-        <a:srgbClr val="000000"/>
-      </a:dk1>
-      <a:lt1>
-        <a:srgbClr val="FFFFFF"/>
-      </a:lt1>
-      <a:dk2>
-        <a:srgbClr val="158158"/>
-      </a:dk2>
-      <a:lt2>
-        <a:srgbClr val="F3F3F3"/>
-      </a:lt2>
-      <a:accent1>
-        <a:srgbClr val="058DC7"/>
-      </a:accent1>
-      <a:accent2>
-        <a:srgbClr val="50B432"/>
-      </a:accent2>
-      <a:accent3>
-        <a:srgbClr val="ED561B"/>
-      </a:accent3>
-      <a:accent4>
-        <a:srgbClr val="EDEF00"/>
-      </a:accent4>
-      <a:accent5>
-        <a:srgbClr val="24CBE5"/>
-      </a:accent5>
-      <a:accent6>
-        <a:srgbClr val="64E572"/>
-      </a:accent6>
-      <a:hlink>
-        <a:srgbClr val="2200CC"/>
-      </a:hlink>
-      <a:folHlink>
-        <a:srgbClr val="551A8B"/>
-      </a:folHlink>
-    </a:clrScheme>
-    <a:fontScheme name="Office">
-      <a:majorFont>
-        <a:latin typeface="Arial"/>
-        <a:ea typeface=""/>
-        <a:cs typeface=""/>
-        <a:font script="Jpan" typeface="ＭＳ Ｐゴシック"/>
-        <a:font script="Hang" typeface="맑은 고딕"/>
-        <a:font script="Hans" typeface="宋体"/>
-        <a:font script="Hant" typeface="新細明體"/>
-        <a:font script="Arab" typeface="Times New Roman"/>
-        <a:font script="Hebr" typeface="Times New Roman"/>
-        <a:font script="Thai" typeface="Angsana New"/>
-        <a:font script="Ethi" typeface="Nyala"/>
-        <a:font script="Beng" typeface="Vrinda"/>
-        <a:font script="Gujr" typeface="Shruti"/>
-        <a:font script="Khmr" typeface="MoolBoran"/>
-        <a:font script="Knda" typeface="Tunga"/>
-        <a:font script="Guru" typeface="Raavi"/>
-        <a:font script="Cans" typeface="Euphemia"/>
-        <a:font script="Cher" typeface="Plantagenet Cherokee"/>
-        <a:font script="Yiii" typeface="Microsoft Yi Baiti"/>
-        <a:font script="Tibt" typeface="Microsoft Himalaya"/>
-        <a:font script="Thaa" typeface="MV Boli"/>
-        <a:font script="Deva" typeface="Mangal"/>
-        <a:font script="Telu" typeface="Gautami"/>
-        <a:font script="Taml" typeface="Latha"/>
-        <a:font script="Syrc" typeface="Estrangelo Edessa"/>
-        <a:font script="Orya" typeface="Kalinga"/>
-        <a:font script="Mlym" typeface="Kartika"/>
-        <a:font script="Laoo" typeface="DokChampa"/>
-        <a:font script="Sinh" typeface="Iskoola Pota"/>
-        <a:font script="Mong" typeface="Mongolian Baiti"/>
-        <a:font script="Viet" typeface="Times New Roman"/>
-        <a:font script="Uigh" typeface="Microsoft Uighur"/>
-        <a:font script="Geor" typeface="Sylfaen"/>
-      </a:majorFont>
-      <a:minorFont>
-        <a:latin typeface="Arial"/>
-        <a:ea typeface=""/>
-        <a:cs typeface=""/>
-        <a:font script="Jpan" typeface="ＭＳ Ｐゴシック"/>
-        <a:font script="Hang" typeface="맑은 고딕"/>
-        <a:font script="Hans" typeface="宋体"/>
-        <a:font script="Hant" typeface="新細明體"/>
-        <a:font script="Arab" typeface="Arial"/>
-        <a:font script="Hebr" typeface="Arial"/>
-        <a:font script="Thai" typeface="Cordia New"/>
-        <a:font script="Ethi" typeface="Nyala"/>
-        <a:font script="Beng" typeface="Vrinda"/>
-        <a:font script="Gujr" typeface="Shruti"/>
-        <a:font script="Khmr" typeface="DaunPenh"/>
-        <a:font script="Knda" typeface="Tunga"/>
-        <a:font script="Guru" typeface="Raavi"/>
-        <a:font script="Cans" typeface="Euphemia"/>
-        <a:font script="Cher" typeface="Plantagenet Cherokee"/>
-        <a:font script="Yiii" typeface="Microsoft Yi Baiti"/>
-        <a:font script="Tibt" typeface="Microsoft Himalaya"/>
-        <a:font script="Thaa" typeface="MV Boli"/>
-        <a:font script="Deva" typeface="Mangal"/>
-        <a:font script="Telu" typeface="Gautami"/>
-        <a:font script="Taml" typeface="Latha"/>
-        <a:font script="Syrc" typeface="Estrangelo Edessa"/>
-        <a:font script="Orya" typeface="Kalinga"/>
-        <a:font script="Mlym" typeface="Kartika"/>
-        <a:font script="Laoo" typeface="DokChampa"/>
-        <a:font script="Sinh" typeface="Iskoola Pota"/>
-        <a:font script="Mong" typeface="Mongolian Baiti"/>
-        <a:font script="Viet" typeface="Arial"/>
-        <a:font script="Uigh" typeface="Microsoft Uighur"/>
-        <a:font script="Geor" typeface="Sylfaen"/>
-      </a:minorFont>
-    </a:fontScheme>
-    <a:fmtScheme name="Office">
-      <a:fillStyleLst>
-        <a:solidFill>
-          <a:schemeClr val="phClr"/>
-        </a:solidFill>
-        <a:gradFill rotWithShape="1">
-          <a:gsLst>
-            <a:gs pos="0">
-              <a:schemeClr val="phClr">
-                <a:tint val="50000"/>
-                <a:satMod val="300000"/>
-              </a:schemeClr>
-            </a:gs>
-            <a:gs pos="35000">
-              <a:schemeClr val="phClr">
-                <a:tint val="37000"/>
-                <a:satMod val="300000"/>
-              </a:schemeClr>
-            </a:gs>
-            <a:gs pos="100000">
-              <a:schemeClr val="phClr">
-                <a:tint val="15000"/>
-                <a:satMod val="350000"/>
-              </a:schemeClr>
-            </a:gs>
-          </a:gsLst>
-          <a:lin ang="16200000" scaled="1"/>
-        </a:gradFill>
-        <a:gradFill rotWithShape="1">
-          <a:gsLst>
-            <a:gs pos="0">
-              <a:schemeClr val="phClr">
-                <a:tint val="100000"/>
-                <a:shade val="100000"/>
-                <a:satMod val="130000"/>
-              </a:schemeClr>
-            </a:gs>
-            <a:gs pos="100000">
-              <a:schemeClr val="phClr">
-                <a:tint val="50000"/>
-                <a:shade val="100000"/>
-                <a:satMod val="350000"/>
-              </a:schemeClr>
-            </a:gs>
-          </a:gsLst>
-          <a:lin ang="16200000" scaled="0"/>
-        </a:gradFill>
-      </a:fillStyleLst>
-      <a:lnStyleLst>
-        <a:ln w="9525" cap="flat" cmpd="sng" algn="ctr">
-          <a:solidFill>
-            <a:schemeClr val="phClr">
-              <a:shade val="95000"/>
-              <a:satMod val="105000"/>
-            </a:schemeClr>
-          </a:solidFill>
-          <a:prstDash val="solid"/>
-        </a:ln>
-        <a:ln w="25400" cap="flat" cmpd="sng" algn="ctr">
-          <a:solidFill>
-            <a:schemeClr val="phClr"/>
-          </a:solidFill>
-          <a:prstDash val="solid"/>
-        </a:ln>
-        <a:ln w="38100" cap="flat" cmpd="sng" algn="ctr">
-          <a:solidFill>
-            <a:schemeClr val="phClr"/>
-          </a:solidFill>
-          <a:prstDash val="solid"/>
-        </a:ln>
-      </a:lnStyleLst>
-      <a:effectStyleLst>
-        <a:effectStyle>
-          <a:effectLst>
-            <a:outerShdw blurRad="40000" dist="20000" dir="5400000" rotWithShape="0">
-              <a:srgbClr val="000000">
-                <a:alpha val="38000"/>
-              </a:srgbClr>
-            </a:outerShdw>
-          </a:effectLst>
-        </a:effectStyle>
-        <a:effectStyle>
-          <a:effectLst>
-            <a:outerShdw blurRad="40000" dist="23000" dir="5400000" rotWithShape="0">
-              <a:srgbClr val="000000">
-                <a:alpha val="35000"/>
-              </a:srgbClr>
-            </a:outerShdw>
-          </a:effectLst>
-        </a:effectStyle>
-        <a:effectStyle>
-          <a:effectLst>
-            <a:outerShdw blurRad="40000" dist="23000" dir="5400000" rotWithShape="0">
-              <a:srgbClr val="000000">
-                <a:alpha val="35000"/>
-              </a:srgbClr>
-            </a:outerShdw>
-          </a:effectLst>
-          <a:scene3d>
-            <a:camera prst="orthographicFront">
-              <a:rot lat="0" lon="0" rev="0"/>
-            </a:camera>
-            <a:lightRig rig="threePt" dir="t">
-              <a:rot lat="0" lon="0" rev="1200000"/>
-            </a:lightRig>
-          </a:scene3d>
-          <a:sp3d>
-            <a:bevelT w="63500" h="25400"/>
-          </a:sp3d>
-        </a:effectStyle>
-      </a:effectStyleLst>
-      <a:bgFillStyleLst>
-        <a:solidFill>
-          <a:schemeClr val="phClr"/>
-        </a:solidFill>
-        <a:gradFill rotWithShape="1">
-          <a:gsLst>
-            <a:gs pos="0">
-              <a:schemeClr val="phClr">
-                <a:tint val="40000"/>
-                <a:satMod val="350000"/>
-              </a:schemeClr>
-            </a:gs>
-            <a:gs pos="40000">
-              <a:schemeClr val="phClr">
-                <a:tint val="45000"/>
-                <a:shade val="99000"/>
-                <a:satMod val="350000"/>
-              </a:schemeClr>
-            </a:gs>
-            <a:gs pos="100000">
-              <a:schemeClr val="phClr">
-                <a:shade val="20000"/>
-                <a:satMod val="255000"/>
-              </a:schemeClr>
-            </a:gs>
-          </a:gsLst>
-          <a:path path="circle">
-            <a:fillToRect l="50000" t="-80000" r="50000" b="180000"/>
-          </a:path>
-        </a:gradFill>
-        <a:gradFill rotWithShape="1">
-          <a:gsLst>
-            <a:gs pos="0">
-              <a:schemeClr val="phClr">
-                <a:tint val="80000"/>
-                <a:satMod val="300000"/>
-              </a:schemeClr>
-            </a:gs>
-            <a:gs pos="100000">
-              <a:schemeClr val="phClr">
-                <a:shade val="30000"/>
-                <a:satMod val="200000"/>
-              </a:schemeClr>
-            </a:gs>
-          </a:gsLst>
-          <a:path path="circle">
-            <a:fillToRect l="50000" t="50000" r="50000" b="50000"/>
-          </a:path>
-        </a:gradFill>
-      </a:bgFillStyleLst>
-    </a:fmtScheme>
-  </a:themeElements>
-</a:theme>
 </file>
</xml_diff>